<commit_message>
Last Packet Tracer in my life
</commit_message>
<xml_diff>
--- a/2023년 TeamLog 2학기 프로젝트.pptx
+++ b/2023년 TeamLog 2학기 프로젝트.pptx
@@ -7,7 +7,20 @@
   <p:sldIdLst>
     <p:sldId id="256" r:id="rId2"/>
     <p:sldId id="257" r:id="rId3"/>
-    <p:sldId id="258" r:id="rId4"/>
+    <p:sldId id="259" r:id="rId4"/>
+    <p:sldId id="260" r:id="rId5"/>
+    <p:sldId id="261" r:id="rId6"/>
+    <p:sldId id="262" r:id="rId7"/>
+    <p:sldId id="264" r:id="rId8"/>
+    <p:sldId id="263" r:id="rId9"/>
+    <p:sldId id="266" r:id="rId10"/>
+    <p:sldId id="265" r:id="rId11"/>
+    <p:sldId id="267" r:id="rId12"/>
+    <p:sldId id="268" r:id="rId13"/>
+    <p:sldId id="269" r:id="rId14"/>
+    <p:sldId id="271" r:id="rId15"/>
+    <p:sldId id="272" r:id="rId16"/>
+    <p:sldId id="273" r:id="rId17"/>
   </p:sldIdLst>
   <p:sldSz cx="12192000" cy="6858000"/>
   <p:notesSz cx="6858000" cy="9144000"/>
@@ -106,6 +119,11 @@
       </a:defRPr>
     </a:lvl9pPr>
   </p:defaultTextStyle>
+  <p:extLst>
+    <p:ext uri="{EFAFB233-063F-42B5-8137-9DF3F51BA10A}">
+      <p15:sldGuideLst xmlns:p15="http://schemas.microsoft.com/office/powerpoint/2012/main"/>
+    </p:ext>
+  </p:extLst>
 </p:presentation>
 </file>
 
@@ -256,7 +274,7 @@
           <a:p>
             <a:fld id="{194712D1-C424-4DE6-AE1D-603B0373CC35}" type="datetimeFigureOut">
               <a:rPr lang="ko-KR" altLang="en-US" smtClean="0"/>
-              <a:t>2023-11-26</a:t>
+              <a:t>2023-12-01</a:t>
             </a:fld>
             <a:endParaRPr lang="ko-KR" altLang="en-US"/>
           </a:p>
@@ -454,7 +472,7 @@
           <a:p>
             <a:fld id="{194712D1-C424-4DE6-AE1D-603B0373CC35}" type="datetimeFigureOut">
               <a:rPr lang="ko-KR" altLang="en-US" smtClean="0"/>
-              <a:t>2023-11-26</a:t>
+              <a:t>2023-12-01</a:t>
             </a:fld>
             <a:endParaRPr lang="ko-KR" altLang="en-US"/>
           </a:p>
@@ -662,7 +680,7 @@
           <a:p>
             <a:fld id="{194712D1-C424-4DE6-AE1D-603B0373CC35}" type="datetimeFigureOut">
               <a:rPr lang="ko-KR" altLang="en-US" smtClean="0"/>
-              <a:t>2023-11-26</a:t>
+              <a:t>2023-12-01</a:t>
             </a:fld>
             <a:endParaRPr lang="ko-KR" altLang="en-US"/>
           </a:p>
@@ -860,7 +878,7 @@
           <a:p>
             <a:fld id="{194712D1-C424-4DE6-AE1D-603B0373CC35}" type="datetimeFigureOut">
               <a:rPr lang="ko-KR" altLang="en-US" smtClean="0"/>
-              <a:t>2023-11-26</a:t>
+              <a:t>2023-12-01</a:t>
             </a:fld>
             <a:endParaRPr lang="ko-KR" altLang="en-US"/>
           </a:p>
@@ -1135,7 +1153,7 @@
           <a:p>
             <a:fld id="{194712D1-C424-4DE6-AE1D-603B0373CC35}" type="datetimeFigureOut">
               <a:rPr lang="ko-KR" altLang="en-US" smtClean="0"/>
-              <a:t>2023-11-26</a:t>
+              <a:t>2023-12-01</a:t>
             </a:fld>
             <a:endParaRPr lang="ko-KR" altLang="en-US"/>
           </a:p>
@@ -1400,7 +1418,7 @@
           <a:p>
             <a:fld id="{194712D1-C424-4DE6-AE1D-603B0373CC35}" type="datetimeFigureOut">
               <a:rPr lang="ko-KR" altLang="en-US" smtClean="0"/>
-              <a:t>2023-11-26</a:t>
+              <a:t>2023-12-01</a:t>
             </a:fld>
             <a:endParaRPr lang="ko-KR" altLang="en-US"/>
           </a:p>
@@ -1812,7 +1830,7 @@
           <a:p>
             <a:fld id="{194712D1-C424-4DE6-AE1D-603B0373CC35}" type="datetimeFigureOut">
               <a:rPr lang="ko-KR" altLang="en-US" smtClean="0"/>
-              <a:t>2023-11-26</a:t>
+              <a:t>2023-12-01</a:t>
             </a:fld>
             <a:endParaRPr lang="ko-KR" altLang="en-US"/>
           </a:p>
@@ -1953,7 +1971,7 @@
           <a:p>
             <a:fld id="{194712D1-C424-4DE6-AE1D-603B0373CC35}" type="datetimeFigureOut">
               <a:rPr lang="ko-KR" altLang="en-US" smtClean="0"/>
-              <a:t>2023-11-26</a:t>
+              <a:t>2023-12-01</a:t>
             </a:fld>
             <a:endParaRPr lang="ko-KR" altLang="en-US"/>
           </a:p>
@@ -2066,7 +2084,7 @@
           <a:p>
             <a:fld id="{194712D1-C424-4DE6-AE1D-603B0373CC35}" type="datetimeFigureOut">
               <a:rPr lang="ko-KR" altLang="en-US" smtClean="0"/>
-              <a:t>2023-11-26</a:t>
+              <a:t>2023-12-01</a:t>
             </a:fld>
             <a:endParaRPr lang="ko-KR" altLang="en-US"/>
           </a:p>
@@ -2377,7 +2395,7 @@
           <a:p>
             <a:fld id="{194712D1-C424-4DE6-AE1D-603B0373CC35}" type="datetimeFigureOut">
               <a:rPr lang="ko-KR" altLang="en-US" smtClean="0"/>
-              <a:t>2023-11-26</a:t>
+              <a:t>2023-12-01</a:t>
             </a:fld>
             <a:endParaRPr lang="ko-KR" altLang="en-US"/>
           </a:p>
@@ -2665,7 +2683,7 @@
           <a:p>
             <a:fld id="{194712D1-C424-4DE6-AE1D-603B0373CC35}" type="datetimeFigureOut">
               <a:rPr lang="ko-KR" altLang="en-US" smtClean="0"/>
-              <a:t>2023-11-26</a:t>
+              <a:t>2023-12-01</a:t>
             </a:fld>
             <a:endParaRPr lang="ko-KR" altLang="en-US"/>
           </a:p>
@@ -2906,7 +2924,7 @@
           <a:p>
             <a:fld id="{194712D1-C424-4DE6-AE1D-603B0373CC35}" type="datetimeFigureOut">
               <a:rPr lang="ko-KR" altLang="en-US" smtClean="0"/>
-              <a:t>2023-11-26</a:t>
+              <a:t>2023-12-01</a:t>
             </a:fld>
             <a:endParaRPr lang="ko-KR" altLang="en-US"/>
           </a:p>
@@ -3471,6 +3489,1510 @@
 </p:sld>
 </file>
 
+<file path=ppt/slides/slide10.xml><?xml version="1.0" encoding="utf-8"?>
+<p:sld xmlns:a="http://schemas.openxmlformats.org/drawingml/2006/main" xmlns:r="http://schemas.openxmlformats.org/officeDocument/2006/relationships" xmlns:p="http://schemas.openxmlformats.org/presentationml/2006/main">
+  <p:cSld>
+    <p:bg>
+      <p:bgPr>
+        <a:solidFill>
+          <a:schemeClr val="tx1"/>
+        </a:solidFill>
+        <a:effectLst/>
+      </p:bgPr>
+    </p:bg>
+    <p:spTree>
+      <p:nvGrpSpPr>
+        <p:cNvPr id="1" name=""/>
+        <p:cNvGrpSpPr/>
+        <p:nvPr/>
+      </p:nvGrpSpPr>
+      <p:grpSpPr>
+        <a:xfrm>
+          <a:off x="0" y="0"/>
+          <a:ext cx="0" cy="0"/>
+          <a:chOff x="0" y="0"/>
+          <a:chExt cx="0" cy="0"/>
+        </a:xfrm>
+      </p:grpSpPr>
+      <p:sp>
+        <p:nvSpPr>
+          <p:cNvPr id="2" name="제목 1">
+            <a:extLst>
+              <a:ext uri="{FF2B5EF4-FFF2-40B4-BE49-F238E27FC236}">
+                <a16:creationId xmlns:a16="http://schemas.microsoft.com/office/drawing/2014/main" id="{D743DEC8-DB4B-3911-98B9-1D0071F97151}"/>
+              </a:ext>
+            </a:extLst>
+          </p:cNvPr>
+          <p:cNvSpPr>
+            <a:spLocks noGrp="1"/>
+          </p:cNvSpPr>
+          <p:nvPr>
+            <p:ph type="title"/>
+          </p:nvPr>
+        </p:nvSpPr>
+        <p:spPr>
+          <a:solidFill>
+            <a:schemeClr val="tx1"/>
+          </a:solidFill>
+        </p:spPr>
+        <p:txBody>
+          <a:bodyPr>
+            <a:normAutofit/>
+          </a:bodyPr>
+          <a:lstStyle/>
+          <a:p>
+            <a:pPr algn="ctr"/>
+            <a:r>
+              <a:rPr lang="en-US" altLang="ko-KR" sz="3500" b="1" dirty="0">
+                <a:solidFill>
+                  <a:schemeClr val="bg1"/>
+                </a:solidFill>
+              </a:rPr>
+              <a:t>Client2 Zone</a:t>
+            </a:r>
+            <a:endParaRPr lang="ko-KR" altLang="en-US" sz="3500" b="1" dirty="0">
+              <a:solidFill>
+                <a:schemeClr val="bg1"/>
+              </a:solidFill>
+            </a:endParaRPr>
+          </a:p>
+        </p:txBody>
+      </p:sp>
+      <p:sp>
+        <p:nvSpPr>
+          <p:cNvPr id="3" name="내용 개체 틀 2">
+            <a:extLst>
+              <a:ext uri="{FF2B5EF4-FFF2-40B4-BE49-F238E27FC236}">
+                <a16:creationId xmlns:a16="http://schemas.microsoft.com/office/drawing/2014/main" id="{34C4EE67-9F49-23A0-BBC7-77ABA37EFF16}"/>
+              </a:ext>
+            </a:extLst>
+          </p:cNvPr>
+          <p:cNvSpPr>
+            <a:spLocks noGrp="1"/>
+          </p:cNvSpPr>
+          <p:nvPr>
+            <p:ph idx="1"/>
+          </p:nvPr>
+        </p:nvSpPr>
+        <p:spPr>
+          <a:xfrm>
+            <a:off x="838200" y="1825625"/>
+            <a:ext cx="10515600" cy="1325563"/>
+          </a:xfrm>
+        </p:spPr>
+        <p:txBody>
+          <a:bodyPr>
+            <a:normAutofit/>
+          </a:bodyPr>
+          <a:lstStyle/>
+          <a:p>
+            <a:pPr marL="0" indent="0" algn="ctr">
+              <a:buNone/>
+            </a:pPr>
+            <a:r>
+              <a:rPr lang="en-US" altLang="ko-KR" sz="2300" b="1" dirty="0">
+                <a:solidFill>
+                  <a:schemeClr val="bg1"/>
+                </a:solidFill>
+              </a:rPr>
+              <a:t>Client2 Cluster</a:t>
+            </a:r>
+            <a:r>
+              <a:rPr lang="ko-KR" altLang="en-US" sz="2300" b="1" dirty="0">
+                <a:solidFill>
+                  <a:schemeClr val="bg1"/>
+                </a:solidFill>
+              </a:rPr>
+              <a:t>에서는 </a:t>
+            </a:r>
+            <a:r>
+              <a:rPr lang="en-US" altLang="ko-KR" sz="2300" b="1" dirty="0">
+                <a:solidFill>
+                  <a:schemeClr val="bg1"/>
+                </a:solidFill>
+              </a:rPr>
+              <a:t>Wireless </a:t>
+            </a:r>
+            <a:r>
+              <a:rPr lang="ko-KR" altLang="en-US" sz="2300" b="1" dirty="0">
+                <a:solidFill>
+                  <a:schemeClr val="bg1"/>
+                </a:solidFill>
+              </a:rPr>
+              <a:t>장비를 중점으로 두어 </a:t>
+            </a:r>
+            <a:endParaRPr lang="en-US" altLang="ko-KR" sz="2300" b="1" dirty="0">
+              <a:solidFill>
+                <a:schemeClr val="bg1"/>
+              </a:solidFill>
+            </a:endParaRPr>
+          </a:p>
+          <a:p>
+            <a:pPr marL="0" indent="0" algn="ctr">
+              <a:buNone/>
+            </a:pPr>
+            <a:r>
+              <a:rPr lang="en-US" altLang="ko-KR" sz="2300" b="1" dirty="0" err="1">
+                <a:solidFill>
+                  <a:schemeClr val="bg1"/>
+                </a:solidFill>
+              </a:rPr>
+              <a:t>HomeRouter</a:t>
+            </a:r>
+            <a:r>
+              <a:rPr lang="ko-KR" altLang="en-US" sz="2300" b="1" dirty="0">
+                <a:solidFill>
+                  <a:schemeClr val="bg1"/>
+                </a:solidFill>
+              </a:rPr>
+              <a:t>와 </a:t>
+            </a:r>
+            <a:r>
+              <a:rPr lang="en-US" altLang="ko-KR" sz="2300" b="1" dirty="0">
+                <a:solidFill>
+                  <a:schemeClr val="bg1"/>
+                </a:solidFill>
+              </a:rPr>
+              <a:t>Cell Tower , Cell Tower Office</a:t>
+            </a:r>
+            <a:r>
+              <a:rPr lang="ko-KR" altLang="en-US" sz="2300" b="1" dirty="0">
+                <a:solidFill>
+                  <a:schemeClr val="bg1"/>
+                </a:solidFill>
+              </a:rPr>
+              <a:t>를 배치하였습니다</a:t>
+            </a:r>
+            <a:r>
+              <a:rPr lang="en-US" altLang="ko-KR" sz="2300" b="1" dirty="0">
+                <a:solidFill>
+                  <a:schemeClr val="bg1"/>
+                </a:solidFill>
+              </a:rPr>
+              <a:t>.</a:t>
+            </a:r>
+            <a:r>
+              <a:rPr lang="ko-KR" altLang="en-US" sz="2300" b="1" dirty="0">
+                <a:solidFill>
+                  <a:schemeClr val="bg1"/>
+                </a:solidFill>
+              </a:rPr>
+              <a:t>  </a:t>
+            </a:r>
+            <a:endParaRPr lang="en-US" altLang="ko-KR" sz="2300" b="1" dirty="0">
+              <a:solidFill>
+                <a:schemeClr val="bg1"/>
+              </a:solidFill>
+            </a:endParaRPr>
+          </a:p>
+          <a:p>
+            <a:pPr marL="0" indent="0" algn="ctr">
+              <a:buNone/>
+            </a:pPr>
+            <a:endParaRPr lang="en-US" altLang="ko-KR" sz="2300" b="1" dirty="0">
+              <a:solidFill>
+                <a:schemeClr val="bg1"/>
+              </a:solidFill>
+            </a:endParaRPr>
+          </a:p>
+        </p:txBody>
+      </p:sp>
+      <p:pic>
+        <p:nvPicPr>
+          <p:cNvPr id="4" name="그래픽 3" descr="사용자 윤곽선">
+            <a:extLst>
+              <a:ext uri="{FF2B5EF4-FFF2-40B4-BE49-F238E27FC236}">
+                <a16:creationId xmlns:a16="http://schemas.microsoft.com/office/drawing/2014/main" id="{F14BB936-3058-83CF-5C0A-27EEF2468E1A}"/>
+              </a:ext>
+            </a:extLst>
+          </p:cNvPr>
+          <p:cNvPicPr>
+            <a:picLocks noChangeAspect="1"/>
+          </p:cNvPicPr>
+          <p:nvPr/>
+        </p:nvPicPr>
+        <p:blipFill>
+          <a:blip r:embed="rId2">
+            <a:extLst>
+              <a:ext uri="{28A0092B-C50C-407E-A947-70E740481C1C}">
+                <a14:useLocalDpi xmlns:a14="http://schemas.microsoft.com/office/drawing/2010/main" val="0"/>
+              </a:ext>
+              <a:ext uri="{96DAC541-7B7A-43D3-8B79-37D633B846F1}">
+                <asvg:svgBlip xmlns:asvg="http://schemas.microsoft.com/office/drawing/2016/SVG/main" r:embed="rId3"/>
+              </a:ext>
+            </a:extLst>
+          </a:blip>
+          <a:stretch>
+            <a:fillRect/>
+          </a:stretch>
+        </p:blipFill>
+        <p:spPr>
+          <a:xfrm>
+            <a:off x="3637721" y="570706"/>
+            <a:ext cx="914400" cy="914400"/>
+          </a:xfrm>
+          <a:prstGeom prst="rect">
+            <a:avLst/>
+          </a:prstGeom>
+        </p:spPr>
+      </p:pic>
+    </p:spTree>
+    <p:extLst>
+      <p:ext uri="{BB962C8B-B14F-4D97-AF65-F5344CB8AC3E}">
+        <p14:creationId xmlns:p14="http://schemas.microsoft.com/office/powerpoint/2010/main" val="2863201298"/>
+      </p:ext>
+    </p:extLst>
+  </p:cSld>
+  <p:clrMapOvr>
+    <a:masterClrMapping/>
+  </p:clrMapOvr>
+</p:sld>
+</file>
+
+<file path=ppt/slides/slide11.xml><?xml version="1.0" encoding="utf-8"?>
+<p:sld xmlns:a="http://schemas.openxmlformats.org/drawingml/2006/main" xmlns:r="http://schemas.openxmlformats.org/officeDocument/2006/relationships" xmlns:p="http://schemas.openxmlformats.org/presentationml/2006/main">
+  <p:cSld>
+    <p:bg>
+      <p:bgPr>
+        <a:solidFill>
+          <a:schemeClr val="tx1"/>
+        </a:solidFill>
+        <a:effectLst/>
+      </p:bgPr>
+    </p:bg>
+    <p:spTree>
+      <p:nvGrpSpPr>
+        <p:cNvPr id="1" name=""/>
+        <p:cNvGrpSpPr/>
+        <p:nvPr/>
+      </p:nvGrpSpPr>
+      <p:grpSpPr>
+        <a:xfrm>
+          <a:off x="0" y="0"/>
+          <a:ext cx="0" cy="0"/>
+          <a:chOff x="0" y="0"/>
+          <a:chExt cx="0" cy="0"/>
+        </a:xfrm>
+      </p:grpSpPr>
+      <p:pic>
+        <p:nvPicPr>
+          <p:cNvPr id="3" name="그림 2">
+            <a:extLst>
+              <a:ext uri="{FF2B5EF4-FFF2-40B4-BE49-F238E27FC236}">
+                <a16:creationId xmlns:a16="http://schemas.microsoft.com/office/drawing/2014/main" id="{A8B10E83-AC77-9427-6658-39A53D60A6A5}"/>
+              </a:ext>
+            </a:extLst>
+          </p:cNvPr>
+          <p:cNvPicPr>
+            <a:picLocks noChangeAspect="1"/>
+          </p:cNvPicPr>
+          <p:nvPr/>
+        </p:nvPicPr>
+        <p:blipFill>
+          <a:blip r:embed="rId2"/>
+          <a:stretch>
+            <a:fillRect/>
+          </a:stretch>
+        </p:blipFill>
+        <p:spPr>
+          <a:xfrm>
+            <a:off x="0" y="381000"/>
+            <a:ext cx="12181702" cy="6096000"/>
+          </a:xfrm>
+          <a:prstGeom prst="rect">
+            <a:avLst/>
+          </a:prstGeom>
+        </p:spPr>
+      </p:pic>
+    </p:spTree>
+    <p:extLst>
+      <p:ext uri="{BB962C8B-B14F-4D97-AF65-F5344CB8AC3E}">
+        <p14:creationId xmlns:p14="http://schemas.microsoft.com/office/powerpoint/2010/main" val="2655782625"/>
+      </p:ext>
+    </p:extLst>
+  </p:cSld>
+  <p:clrMapOvr>
+    <a:masterClrMapping/>
+  </p:clrMapOvr>
+</p:sld>
+</file>
+
+<file path=ppt/slides/slide12.xml><?xml version="1.0" encoding="utf-8"?>
+<p:sld xmlns:a="http://schemas.openxmlformats.org/drawingml/2006/main" xmlns:r="http://schemas.openxmlformats.org/officeDocument/2006/relationships" xmlns:p="http://schemas.openxmlformats.org/presentationml/2006/main">
+  <p:cSld>
+    <p:bg>
+      <p:bgPr>
+        <a:solidFill>
+          <a:schemeClr val="tx1"/>
+        </a:solidFill>
+        <a:effectLst/>
+      </p:bgPr>
+    </p:bg>
+    <p:spTree>
+      <p:nvGrpSpPr>
+        <p:cNvPr id="1" name=""/>
+        <p:cNvGrpSpPr/>
+        <p:nvPr/>
+      </p:nvGrpSpPr>
+      <p:grpSpPr>
+        <a:xfrm>
+          <a:off x="0" y="0"/>
+          <a:ext cx="0" cy="0"/>
+          <a:chOff x="0" y="0"/>
+          <a:chExt cx="0" cy="0"/>
+        </a:xfrm>
+      </p:grpSpPr>
+      <p:sp>
+        <p:nvSpPr>
+          <p:cNvPr id="2" name="제목 1">
+            <a:extLst>
+              <a:ext uri="{FF2B5EF4-FFF2-40B4-BE49-F238E27FC236}">
+                <a16:creationId xmlns:a16="http://schemas.microsoft.com/office/drawing/2014/main" id="{D743DEC8-DB4B-3911-98B9-1D0071F97151}"/>
+              </a:ext>
+            </a:extLst>
+          </p:cNvPr>
+          <p:cNvSpPr>
+            <a:spLocks noGrp="1"/>
+          </p:cNvSpPr>
+          <p:nvPr>
+            <p:ph type="title"/>
+          </p:nvPr>
+        </p:nvSpPr>
+        <p:spPr>
+          <a:solidFill>
+            <a:schemeClr val="tx1"/>
+          </a:solidFill>
+        </p:spPr>
+        <p:txBody>
+          <a:bodyPr>
+            <a:normAutofit/>
+          </a:bodyPr>
+          <a:lstStyle/>
+          <a:p>
+            <a:pPr algn="ctr"/>
+            <a:r>
+              <a:rPr lang="en-US" altLang="ko-KR" sz="3500" b="1" dirty="0">
+                <a:solidFill>
+                  <a:schemeClr val="bg1"/>
+                </a:solidFill>
+              </a:rPr>
+              <a:t>Server Zone</a:t>
+            </a:r>
+            <a:endParaRPr lang="ko-KR" altLang="en-US" sz="3500" b="1" dirty="0">
+              <a:solidFill>
+                <a:schemeClr val="bg1"/>
+              </a:solidFill>
+            </a:endParaRPr>
+          </a:p>
+        </p:txBody>
+      </p:sp>
+      <p:sp>
+        <p:nvSpPr>
+          <p:cNvPr id="3" name="내용 개체 틀 2">
+            <a:extLst>
+              <a:ext uri="{FF2B5EF4-FFF2-40B4-BE49-F238E27FC236}">
+                <a16:creationId xmlns:a16="http://schemas.microsoft.com/office/drawing/2014/main" id="{34C4EE67-9F49-23A0-BBC7-77ABA37EFF16}"/>
+              </a:ext>
+            </a:extLst>
+          </p:cNvPr>
+          <p:cNvSpPr>
+            <a:spLocks noGrp="1"/>
+          </p:cNvSpPr>
+          <p:nvPr>
+            <p:ph idx="1"/>
+          </p:nvPr>
+        </p:nvSpPr>
+        <p:spPr>
+          <a:xfrm>
+            <a:off x="838200" y="1825625"/>
+            <a:ext cx="10515600" cy="1325563"/>
+          </a:xfrm>
+        </p:spPr>
+        <p:txBody>
+          <a:bodyPr>
+            <a:normAutofit/>
+          </a:bodyPr>
+          <a:lstStyle/>
+          <a:p>
+            <a:pPr marL="0" indent="0" algn="ctr">
+              <a:buNone/>
+            </a:pPr>
+            <a:r>
+              <a:rPr lang="en-US" altLang="ko-KR" sz="2300" b="1" dirty="0">
+                <a:solidFill>
+                  <a:schemeClr val="bg1"/>
+                </a:solidFill>
+              </a:rPr>
+              <a:t>Server</a:t>
+            </a:r>
+            <a:r>
+              <a:rPr lang="ko-KR" altLang="en-US" sz="2300" b="1" dirty="0">
+                <a:solidFill>
+                  <a:schemeClr val="bg1"/>
+                </a:solidFill>
+              </a:rPr>
+              <a:t> </a:t>
+            </a:r>
+            <a:r>
+              <a:rPr lang="en-US" altLang="ko-KR" sz="2300" b="1" dirty="0">
+                <a:solidFill>
+                  <a:schemeClr val="bg1"/>
+                </a:solidFill>
+              </a:rPr>
+              <a:t>Zone</a:t>
+            </a:r>
+            <a:r>
+              <a:rPr lang="ko-KR" altLang="en-US" sz="2300" b="1" dirty="0">
+                <a:solidFill>
+                  <a:schemeClr val="bg1"/>
+                </a:solidFill>
+              </a:rPr>
+              <a:t>에는 </a:t>
+            </a:r>
+            <a:r>
+              <a:rPr lang="en-US" altLang="ko-KR" sz="2300" b="1" dirty="0" err="1">
+                <a:solidFill>
+                  <a:schemeClr val="bg1"/>
+                </a:solidFill>
+              </a:rPr>
+              <a:t>Dns</a:t>
+            </a:r>
+            <a:r>
+              <a:rPr lang="en-US" altLang="ko-KR" sz="2300" b="1" dirty="0">
+                <a:solidFill>
+                  <a:schemeClr val="bg1"/>
+                </a:solidFill>
+              </a:rPr>
+              <a:t> , Http , AAA , DHCP </a:t>
+            </a:r>
+            <a:r>
+              <a:rPr lang="ko-KR" altLang="en-US" sz="2300" b="1" dirty="0">
+                <a:solidFill>
+                  <a:schemeClr val="bg1"/>
+                </a:solidFill>
+              </a:rPr>
+              <a:t>서버를 배치하였습니다</a:t>
+            </a:r>
+            <a:r>
+              <a:rPr lang="en-US" altLang="ko-KR" sz="2300" b="1" dirty="0">
+                <a:solidFill>
+                  <a:schemeClr val="bg1"/>
+                </a:solidFill>
+              </a:rPr>
+              <a:t>.</a:t>
+            </a:r>
+          </a:p>
+          <a:p>
+            <a:pPr marL="0" indent="0" algn="ctr">
+              <a:buNone/>
+            </a:pPr>
+            <a:r>
+              <a:rPr lang="en-US" altLang="ko-KR" sz="2300" b="1" dirty="0" err="1">
+                <a:solidFill>
+                  <a:schemeClr val="bg1"/>
+                </a:solidFill>
+              </a:rPr>
+              <a:t>Dns</a:t>
+            </a:r>
+            <a:r>
+              <a:rPr lang="en-US" altLang="ko-KR" sz="2300" b="1" dirty="0">
+                <a:solidFill>
+                  <a:schemeClr val="bg1"/>
+                </a:solidFill>
+              </a:rPr>
+              <a:t> , HTTP , DHCP </a:t>
+            </a:r>
+            <a:r>
+              <a:rPr lang="ko-KR" altLang="en-US" sz="2300" b="1" dirty="0">
+                <a:solidFill>
+                  <a:schemeClr val="bg1"/>
+                </a:solidFill>
+              </a:rPr>
+              <a:t>서버는 </a:t>
+            </a:r>
+            <a:r>
+              <a:rPr lang="en-US" altLang="ko-KR" sz="2300" b="1" dirty="0">
+                <a:solidFill>
+                  <a:schemeClr val="bg1"/>
+                </a:solidFill>
+              </a:rPr>
+              <a:t>ASA </a:t>
+            </a:r>
+            <a:r>
+              <a:rPr lang="ko-KR" altLang="en-US" sz="2300" b="1" dirty="0">
+                <a:solidFill>
+                  <a:schemeClr val="bg1"/>
+                </a:solidFill>
+              </a:rPr>
+              <a:t>방화벽을 이용하여 패킷을 관리하였습니다</a:t>
+            </a:r>
+            <a:r>
+              <a:rPr lang="en-US" altLang="ko-KR" sz="2300" b="1" dirty="0">
+                <a:solidFill>
+                  <a:schemeClr val="bg1"/>
+                </a:solidFill>
+              </a:rPr>
+              <a:t>.</a:t>
+            </a:r>
+          </a:p>
+        </p:txBody>
+      </p:sp>
+      <p:pic>
+        <p:nvPicPr>
+          <p:cNvPr id="5" name="그래픽 4" descr="데이터베이스 단색으로 채워진">
+            <a:extLst>
+              <a:ext uri="{FF2B5EF4-FFF2-40B4-BE49-F238E27FC236}">
+                <a16:creationId xmlns:a16="http://schemas.microsoft.com/office/drawing/2014/main" id="{ECD8B849-F2F7-DC80-7210-6DD09570F293}"/>
+              </a:ext>
+            </a:extLst>
+          </p:cNvPr>
+          <p:cNvPicPr>
+            <a:picLocks noChangeAspect="1"/>
+          </p:cNvPicPr>
+          <p:nvPr/>
+        </p:nvPicPr>
+        <p:blipFill>
+          <a:blip r:embed="rId2">
+            <a:extLst>
+              <a:ext uri="{28A0092B-C50C-407E-A947-70E740481C1C}">
+                <a14:useLocalDpi xmlns:a14="http://schemas.microsoft.com/office/drawing/2010/main" val="0"/>
+              </a:ext>
+              <a:ext uri="{96DAC541-7B7A-43D3-8B79-37D633B846F1}">
+                <asvg:svgBlip xmlns:asvg="http://schemas.microsoft.com/office/drawing/2016/SVG/main" r:embed="rId3"/>
+              </a:ext>
+            </a:extLst>
+          </a:blip>
+          <a:stretch>
+            <a:fillRect/>
+          </a:stretch>
+        </p:blipFill>
+        <p:spPr>
+          <a:xfrm>
+            <a:off x="3756734" y="570706"/>
+            <a:ext cx="914400" cy="914400"/>
+          </a:xfrm>
+          <a:prstGeom prst="rect">
+            <a:avLst/>
+          </a:prstGeom>
+        </p:spPr>
+      </p:pic>
+    </p:spTree>
+    <p:extLst>
+      <p:ext uri="{BB962C8B-B14F-4D97-AF65-F5344CB8AC3E}">
+        <p14:creationId xmlns:p14="http://schemas.microsoft.com/office/powerpoint/2010/main" val="3028409452"/>
+      </p:ext>
+    </p:extLst>
+  </p:cSld>
+  <p:clrMapOvr>
+    <a:masterClrMapping/>
+  </p:clrMapOvr>
+</p:sld>
+</file>
+
+<file path=ppt/slides/slide13.xml><?xml version="1.0" encoding="utf-8"?>
+<p:sld xmlns:a="http://schemas.openxmlformats.org/drawingml/2006/main" xmlns:r="http://schemas.openxmlformats.org/officeDocument/2006/relationships" xmlns:p="http://schemas.openxmlformats.org/presentationml/2006/main">
+  <p:cSld>
+    <p:bg>
+      <p:bgPr>
+        <a:solidFill>
+          <a:schemeClr val="tx1"/>
+        </a:solidFill>
+        <a:effectLst/>
+      </p:bgPr>
+    </p:bg>
+    <p:spTree>
+      <p:nvGrpSpPr>
+        <p:cNvPr id="1" name=""/>
+        <p:cNvGrpSpPr/>
+        <p:nvPr/>
+      </p:nvGrpSpPr>
+      <p:grpSpPr>
+        <a:xfrm>
+          <a:off x="0" y="0"/>
+          <a:ext cx="0" cy="0"/>
+          <a:chOff x="0" y="0"/>
+          <a:chExt cx="0" cy="0"/>
+        </a:xfrm>
+      </p:grpSpPr>
+      <p:pic>
+        <p:nvPicPr>
+          <p:cNvPr id="4" name="그림 3">
+            <a:extLst>
+              <a:ext uri="{FF2B5EF4-FFF2-40B4-BE49-F238E27FC236}">
+                <a16:creationId xmlns:a16="http://schemas.microsoft.com/office/drawing/2014/main" id="{9D32A0B2-E5A7-B4B8-3D49-63DA1F83E2BD}"/>
+              </a:ext>
+            </a:extLst>
+          </p:cNvPr>
+          <p:cNvPicPr>
+            <a:picLocks noChangeAspect="1"/>
+          </p:cNvPicPr>
+          <p:nvPr/>
+        </p:nvPicPr>
+        <p:blipFill>
+          <a:blip r:embed="rId2"/>
+          <a:stretch>
+            <a:fillRect/>
+          </a:stretch>
+        </p:blipFill>
+        <p:spPr>
+          <a:xfrm>
+            <a:off x="0" y="184509"/>
+            <a:ext cx="12192000" cy="6488981"/>
+          </a:xfrm>
+          <a:prstGeom prst="rect">
+            <a:avLst/>
+          </a:prstGeom>
+        </p:spPr>
+      </p:pic>
+    </p:spTree>
+    <p:extLst>
+      <p:ext uri="{BB962C8B-B14F-4D97-AF65-F5344CB8AC3E}">
+        <p14:creationId xmlns:p14="http://schemas.microsoft.com/office/powerpoint/2010/main" val="2310110739"/>
+      </p:ext>
+    </p:extLst>
+  </p:cSld>
+  <p:clrMapOvr>
+    <a:masterClrMapping/>
+  </p:clrMapOvr>
+</p:sld>
+</file>
+
+<file path=ppt/slides/slide14.xml><?xml version="1.0" encoding="utf-8"?>
+<p:sld xmlns:a="http://schemas.openxmlformats.org/drawingml/2006/main" xmlns:r="http://schemas.openxmlformats.org/officeDocument/2006/relationships" xmlns:p="http://schemas.openxmlformats.org/presentationml/2006/main">
+  <p:cSld>
+    <p:bg>
+      <p:bgPr>
+        <a:solidFill>
+          <a:schemeClr val="tx1"/>
+        </a:solidFill>
+        <a:effectLst/>
+      </p:bgPr>
+    </p:bg>
+    <p:spTree>
+      <p:nvGrpSpPr>
+        <p:cNvPr id="1" name=""/>
+        <p:cNvGrpSpPr/>
+        <p:nvPr/>
+      </p:nvGrpSpPr>
+      <p:grpSpPr>
+        <a:xfrm>
+          <a:off x="0" y="0"/>
+          <a:ext cx="0" cy="0"/>
+          <a:chOff x="0" y="0"/>
+          <a:chExt cx="0" cy="0"/>
+        </a:xfrm>
+      </p:grpSpPr>
+      <p:sp>
+        <p:nvSpPr>
+          <p:cNvPr id="2" name="제목 1">
+            <a:extLst>
+              <a:ext uri="{FF2B5EF4-FFF2-40B4-BE49-F238E27FC236}">
+                <a16:creationId xmlns:a16="http://schemas.microsoft.com/office/drawing/2014/main" id="{D743DEC8-DB4B-3911-98B9-1D0071F97151}"/>
+              </a:ext>
+            </a:extLst>
+          </p:cNvPr>
+          <p:cNvSpPr>
+            <a:spLocks noGrp="1"/>
+          </p:cNvSpPr>
+          <p:nvPr>
+            <p:ph type="title"/>
+          </p:nvPr>
+        </p:nvSpPr>
+        <p:spPr>
+          <a:solidFill>
+            <a:schemeClr val="tx1"/>
+          </a:solidFill>
+        </p:spPr>
+        <p:txBody>
+          <a:bodyPr>
+            <a:normAutofit/>
+          </a:bodyPr>
+          <a:lstStyle/>
+          <a:p>
+            <a:pPr algn="ctr"/>
+            <a:r>
+              <a:rPr lang="en-US" altLang="ko-KR" sz="3500" b="1" dirty="0">
+                <a:solidFill>
+                  <a:schemeClr val="bg1"/>
+                </a:solidFill>
+              </a:rPr>
+              <a:t>Ping Test</a:t>
+            </a:r>
+            <a:endParaRPr lang="ko-KR" altLang="en-US" sz="3500" b="1" dirty="0">
+              <a:solidFill>
+                <a:schemeClr val="bg1"/>
+              </a:solidFill>
+            </a:endParaRPr>
+          </a:p>
+        </p:txBody>
+      </p:sp>
+      <p:sp>
+        <p:nvSpPr>
+          <p:cNvPr id="3" name="내용 개체 틀 2">
+            <a:extLst>
+              <a:ext uri="{FF2B5EF4-FFF2-40B4-BE49-F238E27FC236}">
+                <a16:creationId xmlns:a16="http://schemas.microsoft.com/office/drawing/2014/main" id="{34C4EE67-9F49-23A0-BBC7-77ABA37EFF16}"/>
+              </a:ext>
+            </a:extLst>
+          </p:cNvPr>
+          <p:cNvSpPr>
+            <a:spLocks noGrp="1"/>
+          </p:cNvSpPr>
+          <p:nvPr>
+            <p:ph idx="1"/>
+          </p:nvPr>
+        </p:nvSpPr>
+        <p:spPr>
+          <a:xfrm>
+            <a:off x="571808" y="2047001"/>
+            <a:ext cx="5691276" cy="436312"/>
+          </a:xfrm>
+        </p:spPr>
+        <p:txBody>
+          <a:bodyPr>
+            <a:noAutofit/>
+          </a:bodyPr>
+          <a:lstStyle/>
+          <a:p>
+            <a:pPr marL="0" indent="0" algn="ctr">
+              <a:buNone/>
+            </a:pPr>
+            <a:r>
+              <a:rPr lang="en-US" altLang="ko-KR" sz="1600" b="1" dirty="0">
+                <a:solidFill>
+                  <a:schemeClr val="bg1"/>
+                </a:solidFill>
+              </a:rPr>
+              <a:t>Server Zone(Laptop0) -&gt; Client Cluster(</a:t>
+            </a:r>
+            <a:r>
+              <a:rPr lang="en-US" altLang="ko-KR" sz="1600" b="1" dirty="0" err="1">
+                <a:solidFill>
+                  <a:schemeClr val="bg1"/>
+                </a:solidFill>
+              </a:rPr>
+              <a:t>TeamLog</a:t>
+            </a:r>
+            <a:r>
+              <a:rPr lang="en-US" altLang="ko-KR" sz="1600" b="1" dirty="0">
+                <a:solidFill>
+                  <a:schemeClr val="bg1"/>
+                </a:solidFill>
+              </a:rPr>
+              <a:t> PC2) </a:t>
+            </a:r>
+          </a:p>
+        </p:txBody>
+      </p:sp>
+      <p:pic>
+        <p:nvPicPr>
+          <p:cNvPr id="6" name="그림 5">
+            <a:extLst>
+              <a:ext uri="{FF2B5EF4-FFF2-40B4-BE49-F238E27FC236}">
+                <a16:creationId xmlns:a16="http://schemas.microsoft.com/office/drawing/2014/main" id="{991C94BD-438C-F4AF-909C-57DB4F48D0B6}"/>
+              </a:ext>
+            </a:extLst>
+          </p:cNvPr>
+          <p:cNvPicPr>
+            <a:picLocks noChangeAspect="1"/>
+          </p:cNvPicPr>
+          <p:nvPr/>
+        </p:nvPicPr>
+        <p:blipFill rotWithShape="1">
+          <a:blip r:embed="rId2"/>
+          <a:srcRect l="925"/>
+          <a:stretch/>
+        </p:blipFill>
+        <p:spPr>
+          <a:xfrm>
+            <a:off x="838201" y="2483313"/>
+            <a:ext cx="5424883" cy="2600325"/>
+          </a:xfrm>
+          <a:prstGeom prst="rect">
+            <a:avLst/>
+          </a:prstGeom>
+        </p:spPr>
+      </p:pic>
+      <p:pic>
+        <p:nvPicPr>
+          <p:cNvPr id="8" name="그림 7">
+            <a:extLst>
+              <a:ext uri="{FF2B5EF4-FFF2-40B4-BE49-F238E27FC236}">
+                <a16:creationId xmlns:a16="http://schemas.microsoft.com/office/drawing/2014/main" id="{16888219-6B51-FCFE-82F2-EDFD52721B0A}"/>
+              </a:ext>
+            </a:extLst>
+          </p:cNvPr>
+          <p:cNvPicPr>
+            <a:picLocks noChangeAspect="1"/>
+          </p:cNvPicPr>
+          <p:nvPr/>
+        </p:nvPicPr>
+        <p:blipFill>
+          <a:blip r:embed="rId3"/>
+          <a:stretch>
+            <a:fillRect/>
+          </a:stretch>
+        </p:blipFill>
+        <p:spPr>
+          <a:xfrm>
+            <a:off x="6263084" y="2948531"/>
+            <a:ext cx="5508094" cy="1942586"/>
+          </a:xfrm>
+          <a:prstGeom prst="rect">
+            <a:avLst/>
+          </a:prstGeom>
+        </p:spPr>
+      </p:pic>
+      <p:sp>
+        <p:nvSpPr>
+          <p:cNvPr id="9" name="내용 개체 틀 2">
+            <a:extLst>
+              <a:ext uri="{FF2B5EF4-FFF2-40B4-BE49-F238E27FC236}">
+                <a16:creationId xmlns:a16="http://schemas.microsoft.com/office/drawing/2014/main" id="{462F7028-8E17-8612-C7FB-DB2B3279930A}"/>
+              </a:ext>
+            </a:extLst>
+          </p:cNvPr>
+          <p:cNvSpPr txBox="1">
+            <a:spLocks/>
+          </p:cNvSpPr>
+          <p:nvPr/>
+        </p:nvSpPr>
+        <p:spPr>
+          <a:xfrm>
+            <a:off x="6263084" y="2048634"/>
+            <a:ext cx="5584626" cy="436312"/>
+          </a:xfrm>
+          <a:prstGeom prst="rect">
+            <a:avLst/>
+          </a:prstGeom>
+        </p:spPr>
+        <p:txBody>
+          <a:bodyPr vert="horz" lIns="91440" tIns="45720" rIns="91440" bIns="45720" rtlCol="0">
+            <a:noAutofit/>
+          </a:bodyPr>
+          <a:lstStyle>
+            <a:lvl1pPr marL="228600" indent="-228600" algn="l" defTabSz="914400" rtl="0" eaLnBrk="1" latinLnBrk="1" hangingPunct="1">
+              <a:lnSpc>
+                <a:spcPct val="90000"/>
+              </a:lnSpc>
+              <a:spcBef>
+                <a:spcPts val="1000"/>
+              </a:spcBef>
+              <a:buFont typeface="Arial" panose="020B0604020202020204" pitchFamily="34" charset="0"/>
+              <a:buChar char="•"/>
+              <a:defRPr sz="2800" kern="1200">
+                <a:solidFill>
+                  <a:schemeClr val="tx1"/>
+                </a:solidFill>
+                <a:latin typeface="+mn-lt"/>
+                <a:ea typeface="+mn-ea"/>
+                <a:cs typeface="+mn-cs"/>
+              </a:defRPr>
+            </a:lvl1pPr>
+            <a:lvl2pPr marL="685800" indent="-228600" algn="l" defTabSz="914400" rtl="0" eaLnBrk="1" latinLnBrk="1" hangingPunct="1">
+              <a:lnSpc>
+                <a:spcPct val="90000"/>
+              </a:lnSpc>
+              <a:spcBef>
+                <a:spcPts val="500"/>
+              </a:spcBef>
+              <a:buFont typeface="Arial" panose="020B0604020202020204" pitchFamily="34" charset="0"/>
+              <a:buChar char="•"/>
+              <a:defRPr sz="2400" kern="1200">
+                <a:solidFill>
+                  <a:schemeClr val="tx1"/>
+                </a:solidFill>
+                <a:latin typeface="+mn-lt"/>
+                <a:ea typeface="+mn-ea"/>
+                <a:cs typeface="+mn-cs"/>
+              </a:defRPr>
+            </a:lvl2pPr>
+            <a:lvl3pPr marL="1143000" indent="-228600" algn="l" defTabSz="914400" rtl="0" eaLnBrk="1" latinLnBrk="1" hangingPunct="1">
+              <a:lnSpc>
+                <a:spcPct val="90000"/>
+              </a:lnSpc>
+              <a:spcBef>
+                <a:spcPts val="500"/>
+              </a:spcBef>
+              <a:buFont typeface="Arial" panose="020B0604020202020204" pitchFamily="34" charset="0"/>
+              <a:buChar char="•"/>
+              <a:defRPr sz="2000" kern="1200">
+                <a:solidFill>
+                  <a:schemeClr val="tx1"/>
+                </a:solidFill>
+                <a:latin typeface="+mn-lt"/>
+                <a:ea typeface="+mn-ea"/>
+                <a:cs typeface="+mn-cs"/>
+              </a:defRPr>
+            </a:lvl3pPr>
+            <a:lvl4pPr marL="1600200" indent="-228600" algn="l" defTabSz="914400" rtl="0" eaLnBrk="1" latinLnBrk="1" hangingPunct="1">
+              <a:lnSpc>
+                <a:spcPct val="90000"/>
+              </a:lnSpc>
+              <a:spcBef>
+                <a:spcPts val="500"/>
+              </a:spcBef>
+              <a:buFont typeface="Arial" panose="020B0604020202020204" pitchFamily="34" charset="0"/>
+              <a:buChar char="•"/>
+              <a:defRPr sz="1800" kern="1200">
+                <a:solidFill>
+                  <a:schemeClr val="tx1"/>
+                </a:solidFill>
+                <a:latin typeface="+mn-lt"/>
+                <a:ea typeface="+mn-ea"/>
+                <a:cs typeface="+mn-cs"/>
+              </a:defRPr>
+            </a:lvl4pPr>
+            <a:lvl5pPr marL="2057400" indent="-228600" algn="l" defTabSz="914400" rtl="0" eaLnBrk="1" latinLnBrk="1" hangingPunct="1">
+              <a:lnSpc>
+                <a:spcPct val="90000"/>
+              </a:lnSpc>
+              <a:spcBef>
+                <a:spcPts val="500"/>
+              </a:spcBef>
+              <a:buFont typeface="Arial" panose="020B0604020202020204" pitchFamily="34" charset="0"/>
+              <a:buChar char="•"/>
+              <a:defRPr sz="1800" kern="1200">
+                <a:solidFill>
+                  <a:schemeClr val="tx1"/>
+                </a:solidFill>
+                <a:latin typeface="+mn-lt"/>
+                <a:ea typeface="+mn-ea"/>
+                <a:cs typeface="+mn-cs"/>
+              </a:defRPr>
+            </a:lvl5pPr>
+            <a:lvl6pPr marL="2514600" indent="-228600" algn="l" defTabSz="914400" rtl="0" eaLnBrk="1" latinLnBrk="1" hangingPunct="1">
+              <a:lnSpc>
+                <a:spcPct val="90000"/>
+              </a:lnSpc>
+              <a:spcBef>
+                <a:spcPts val="500"/>
+              </a:spcBef>
+              <a:buFont typeface="Arial" panose="020B0604020202020204" pitchFamily="34" charset="0"/>
+              <a:buChar char="•"/>
+              <a:defRPr sz="1800" kern="1200">
+                <a:solidFill>
+                  <a:schemeClr val="tx1"/>
+                </a:solidFill>
+                <a:latin typeface="+mn-lt"/>
+                <a:ea typeface="+mn-ea"/>
+                <a:cs typeface="+mn-cs"/>
+              </a:defRPr>
+            </a:lvl6pPr>
+            <a:lvl7pPr marL="2971800" indent="-228600" algn="l" defTabSz="914400" rtl="0" eaLnBrk="1" latinLnBrk="1" hangingPunct="1">
+              <a:lnSpc>
+                <a:spcPct val="90000"/>
+              </a:lnSpc>
+              <a:spcBef>
+                <a:spcPts val="500"/>
+              </a:spcBef>
+              <a:buFont typeface="Arial" panose="020B0604020202020204" pitchFamily="34" charset="0"/>
+              <a:buChar char="•"/>
+              <a:defRPr sz="1800" kern="1200">
+                <a:solidFill>
+                  <a:schemeClr val="tx1"/>
+                </a:solidFill>
+                <a:latin typeface="+mn-lt"/>
+                <a:ea typeface="+mn-ea"/>
+                <a:cs typeface="+mn-cs"/>
+              </a:defRPr>
+            </a:lvl7pPr>
+            <a:lvl8pPr marL="3429000" indent="-228600" algn="l" defTabSz="914400" rtl="0" eaLnBrk="1" latinLnBrk="1" hangingPunct="1">
+              <a:lnSpc>
+                <a:spcPct val="90000"/>
+              </a:lnSpc>
+              <a:spcBef>
+                <a:spcPts val="500"/>
+              </a:spcBef>
+              <a:buFont typeface="Arial" panose="020B0604020202020204" pitchFamily="34" charset="0"/>
+              <a:buChar char="•"/>
+              <a:defRPr sz="1800" kern="1200">
+                <a:solidFill>
+                  <a:schemeClr val="tx1"/>
+                </a:solidFill>
+                <a:latin typeface="+mn-lt"/>
+                <a:ea typeface="+mn-ea"/>
+                <a:cs typeface="+mn-cs"/>
+              </a:defRPr>
+            </a:lvl8pPr>
+            <a:lvl9pPr marL="3886200" indent="-228600" algn="l" defTabSz="914400" rtl="0" eaLnBrk="1" latinLnBrk="1" hangingPunct="1">
+              <a:lnSpc>
+                <a:spcPct val="90000"/>
+              </a:lnSpc>
+              <a:spcBef>
+                <a:spcPts val="500"/>
+              </a:spcBef>
+              <a:buFont typeface="Arial" panose="020B0604020202020204" pitchFamily="34" charset="0"/>
+              <a:buChar char="•"/>
+              <a:defRPr sz="1800" kern="1200">
+                <a:solidFill>
+                  <a:schemeClr val="tx1"/>
+                </a:solidFill>
+                <a:latin typeface="+mn-lt"/>
+                <a:ea typeface="+mn-ea"/>
+                <a:cs typeface="+mn-cs"/>
+              </a:defRPr>
+            </a:lvl9pPr>
+          </a:lstStyle>
+          <a:p>
+            <a:pPr marL="0" indent="0" algn="ctr">
+              <a:buFont typeface="Arial" panose="020B0604020202020204" pitchFamily="34" charset="0"/>
+              <a:buNone/>
+            </a:pPr>
+            <a:r>
+              <a:rPr lang="en-US" altLang="ko-KR" sz="1600" b="1" dirty="0">
+                <a:solidFill>
+                  <a:schemeClr val="bg1"/>
+                </a:solidFill>
+              </a:rPr>
+              <a:t>Server Zone(Laptop0) -&gt; Client Cluster(</a:t>
+            </a:r>
+            <a:r>
+              <a:rPr lang="en-US" altLang="ko-KR" sz="1600" b="1" dirty="0" err="1">
+                <a:solidFill>
+                  <a:schemeClr val="bg1"/>
+                </a:solidFill>
+              </a:rPr>
+              <a:t>TeamLog</a:t>
+            </a:r>
+            <a:r>
+              <a:rPr lang="en-US" altLang="ko-KR" sz="1600" b="1" dirty="0">
+                <a:solidFill>
+                  <a:schemeClr val="bg1"/>
+                </a:solidFill>
+              </a:rPr>
+              <a:t> PC2)</a:t>
+            </a:r>
+          </a:p>
+          <a:p>
+            <a:pPr marL="0" indent="0" algn="ctr">
+              <a:buFont typeface="Arial" panose="020B0604020202020204" pitchFamily="34" charset="0"/>
+              <a:buNone/>
+            </a:pPr>
+            <a:r>
+              <a:rPr lang="en-US" altLang="ko-KR" sz="1600" b="1" dirty="0">
+                <a:solidFill>
+                  <a:schemeClr val="bg1"/>
+                </a:solidFill>
+              </a:rPr>
+              <a:t>Use Tunnel </a:t>
+            </a:r>
+          </a:p>
+        </p:txBody>
+      </p:sp>
+    </p:spTree>
+    <p:extLst>
+      <p:ext uri="{BB962C8B-B14F-4D97-AF65-F5344CB8AC3E}">
+        <p14:creationId xmlns:p14="http://schemas.microsoft.com/office/powerpoint/2010/main" val="1755638822"/>
+      </p:ext>
+    </p:extLst>
+  </p:cSld>
+  <p:clrMapOvr>
+    <a:masterClrMapping/>
+  </p:clrMapOvr>
+</p:sld>
+</file>
+
+<file path=ppt/slides/slide15.xml><?xml version="1.0" encoding="utf-8"?>
+<p:sld xmlns:a="http://schemas.openxmlformats.org/drawingml/2006/main" xmlns:r="http://schemas.openxmlformats.org/officeDocument/2006/relationships" xmlns:p="http://schemas.openxmlformats.org/presentationml/2006/main">
+  <p:cSld>
+    <p:bg>
+      <p:bgPr>
+        <a:solidFill>
+          <a:schemeClr val="tx1"/>
+        </a:solidFill>
+        <a:effectLst/>
+      </p:bgPr>
+    </p:bg>
+    <p:spTree>
+      <p:nvGrpSpPr>
+        <p:cNvPr id="1" name=""/>
+        <p:cNvGrpSpPr/>
+        <p:nvPr/>
+      </p:nvGrpSpPr>
+      <p:grpSpPr>
+        <a:xfrm>
+          <a:off x="0" y="0"/>
+          <a:ext cx="0" cy="0"/>
+          <a:chOff x="0" y="0"/>
+          <a:chExt cx="0" cy="0"/>
+        </a:xfrm>
+      </p:grpSpPr>
+      <p:sp>
+        <p:nvSpPr>
+          <p:cNvPr id="2" name="제목 1">
+            <a:extLst>
+              <a:ext uri="{FF2B5EF4-FFF2-40B4-BE49-F238E27FC236}">
+                <a16:creationId xmlns:a16="http://schemas.microsoft.com/office/drawing/2014/main" id="{D743DEC8-DB4B-3911-98B9-1D0071F97151}"/>
+              </a:ext>
+            </a:extLst>
+          </p:cNvPr>
+          <p:cNvSpPr>
+            <a:spLocks noGrp="1"/>
+          </p:cNvSpPr>
+          <p:nvPr>
+            <p:ph type="title"/>
+          </p:nvPr>
+        </p:nvSpPr>
+        <p:spPr>
+          <a:solidFill>
+            <a:schemeClr val="tx1"/>
+          </a:solidFill>
+        </p:spPr>
+        <p:txBody>
+          <a:bodyPr>
+            <a:normAutofit/>
+          </a:bodyPr>
+          <a:lstStyle/>
+          <a:p>
+            <a:pPr algn="ctr"/>
+            <a:r>
+              <a:rPr lang="en-US" altLang="ko-KR" sz="3500" b="1" dirty="0">
+                <a:solidFill>
+                  <a:schemeClr val="bg1"/>
+                </a:solidFill>
+              </a:rPr>
+              <a:t>Fail</a:t>
+            </a:r>
+            <a:endParaRPr lang="ko-KR" altLang="en-US" sz="3500" b="1" dirty="0">
+              <a:solidFill>
+                <a:schemeClr val="bg1"/>
+              </a:solidFill>
+            </a:endParaRPr>
+          </a:p>
+        </p:txBody>
+      </p:sp>
+      <p:sp>
+        <p:nvSpPr>
+          <p:cNvPr id="3" name="내용 개체 틀 2">
+            <a:extLst>
+              <a:ext uri="{FF2B5EF4-FFF2-40B4-BE49-F238E27FC236}">
+                <a16:creationId xmlns:a16="http://schemas.microsoft.com/office/drawing/2014/main" id="{34C4EE67-9F49-23A0-BBC7-77ABA37EFF16}"/>
+              </a:ext>
+            </a:extLst>
+          </p:cNvPr>
+          <p:cNvSpPr>
+            <a:spLocks noGrp="1"/>
+          </p:cNvSpPr>
+          <p:nvPr>
+            <p:ph idx="1"/>
+          </p:nvPr>
+        </p:nvSpPr>
+        <p:spPr>
+          <a:xfrm>
+            <a:off x="3366837" y="1690688"/>
+            <a:ext cx="5458326" cy="1005807"/>
+          </a:xfrm>
+        </p:spPr>
+        <p:txBody>
+          <a:bodyPr>
+            <a:normAutofit/>
+          </a:bodyPr>
+          <a:lstStyle/>
+          <a:p>
+            <a:r>
+              <a:rPr lang="en-US" altLang="ko-KR" sz="2300" b="1" dirty="0">
+                <a:solidFill>
+                  <a:schemeClr val="bg1"/>
+                </a:solidFill>
+              </a:rPr>
+              <a:t>ASA </a:t>
+            </a:r>
+            <a:r>
+              <a:rPr lang="ko-KR" altLang="en-US" sz="2300" b="1" dirty="0">
+                <a:solidFill>
+                  <a:schemeClr val="bg1"/>
+                </a:solidFill>
+              </a:rPr>
+              <a:t>방화벽 설정이 잘 안되었음</a:t>
+            </a:r>
+            <a:endParaRPr lang="en-US" altLang="ko-KR" sz="2300" b="1" dirty="0">
+              <a:solidFill>
+                <a:schemeClr val="bg1"/>
+              </a:solidFill>
+            </a:endParaRPr>
+          </a:p>
+          <a:p>
+            <a:r>
+              <a:rPr lang="en-US" altLang="ko-KR" sz="2300" b="1" dirty="0">
+                <a:solidFill>
+                  <a:schemeClr val="bg1"/>
+                </a:solidFill>
+              </a:rPr>
+              <a:t>Cell</a:t>
+            </a:r>
+            <a:r>
+              <a:rPr lang="ko-KR" altLang="en-US" sz="2300" b="1" dirty="0">
+                <a:solidFill>
+                  <a:schemeClr val="bg1"/>
+                </a:solidFill>
+              </a:rPr>
+              <a:t> </a:t>
+            </a:r>
+            <a:r>
+              <a:rPr lang="en-US" altLang="ko-KR" sz="2300" b="1" dirty="0">
+                <a:solidFill>
+                  <a:schemeClr val="bg1"/>
+                </a:solidFill>
+              </a:rPr>
+              <a:t>Tower Office</a:t>
+            </a:r>
+            <a:r>
+              <a:rPr lang="ko-KR" altLang="en-US" sz="2300" b="1" dirty="0">
+                <a:solidFill>
+                  <a:schemeClr val="bg1"/>
+                </a:solidFill>
+              </a:rPr>
+              <a:t>가 외부 통신이 안됨</a:t>
+            </a:r>
+            <a:endParaRPr lang="en-US" altLang="ko-KR" sz="2300" b="1" dirty="0">
+              <a:solidFill>
+                <a:schemeClr val="bg1"/>
+              </a:solidFill>
+            </a:endParaRPr>
+          </a:p>
+        </p:txBody>
+      </p:sp>
+      <p:pic>
+        <p:nvPicPr>
+          <p:cNvPr id="1026" name="Picture 2" descr="01화 개구리상의 비애">
+            <a:extLst>
+              <a:ext uri="{FF2B5EF4-FFF2-40B4-BE49-F238E27FC236}">
+                <a16:creationId xmlns:a16="http://schemas.microsoft.com/office/drawing/2014/main" id="{DA9795D8-136F-FBDF-FFB6-24263B39C328}"/>
+              </a:ext>
+            </a:extLst>
+          </p:cNvPr>
+          <p:cNvPicPr>
+            <a:picLocks noChangeAspect="1" noChangeArrowheads="1"/>
+          </p:cNvPicPr>
+          <p:nvPr/>
+        </p:nvPicPr>
+        <p:blipFill>
+          <a:blip r:embed="rId2">
+            <a:extLst>
+              <a:ext uri="{28A0092B-C50C-407E-A947-70E740481C1C}">
+                <a14:useLocalDpi xmlns:a14="http://schemas.microsoft.com/office/drawing/2010/main" val="0"/>
+              </a:ext>
+            </a:extLst>
+          </a:blip>
+          <a:srcRect/>
+          <a:stretch>
+            <a:fillRect/>
+          </a:stretch>
+        </p:blipFill>
+        <p:spPr bwMode="auto">
+          <a:xfrm>
+            <a:off x="4167438" y="2776705"/>
+            <a:ext cx="3857124" cy="3857124"/>
+          </a:xfrm>
+          <a:prstGeom prst="rect">
+            <a:avLst/>
+          </a:prstGeom>
+          <a:noFill/>
+          <a:extLst>
+            <a:ext uri="{909E8E84-426E-40DD-AFC4-6F175D3DCCD1}">
+              <a14:hiddenFill xmlns:a14="http://schemas.microsoft.com/office/drawing/2010/main">
+                <a:solidFill>
+                  <a:srgbClr val="FFFFFF"/>
+                </a:solidFill>
+              </a14:hiddenFill>
+            </a:ext>
+          </a:extLst>
+        </p:spPr>
+      </p:pic>
+    </p:spTree>
+    <p:extLst>
+      <p:ext uri="{BB962C8B-B14F-4D97-AF65-F5344CB8AC3E}">
+        <p14:creationId xmlns:p14="http://schemas.microsoft.com/office/powerpoint/2010/main" val="2472641475"/>
+      </p:ext>
+    </p:extLst>
+  </p:cSld>
+  <p:clrMapOvr>
+    <a:masterClrMapping/>
+  </p:clrMapOvr>
+</p:sld>
+</file>
+
+<file path=ppt/slides/slide16.xml><?xml version="1.0" encoding="utf-8"?>
+<p:sld xmlns:a="http://schemas.openxmlformats.org/drawingml/2006/main" xmlns:r="http://schemas.openxmlformats.org/officeDocument/2006/relationships" xmlns:p="http://schemas.openxmlformats.org/presentationml/2006/main">
+  <p:cSld>
+    <p:bg>
+      <p:bgPr>
+        <a:solidFill>
+          <a:schemeClr val="tx1"/>
+        </a:solidFill>
+        <a:effectLst/>
+      </p:bgPr>
+    </p:bg>
+    <p:spTree>
+      <p:nvGrpSpPr>
+        <p:cNvPr id="1" name=""/>
+        <p:cNvGrpSpPr/>
+        <p:nvPr/>
+      </p:nvGrpSpPr>
+      <p:grpSpPr>
+        <a:xfrm>
+          <a:off x="0" y="0"/>
+          <a:ext cx="0" cy="0"/>
+          <a:chOff x="0" y="0"/>
+          <a:chExt cx="0" cy="0"/>
+        </a:xfrm>
+      </p:grpSpPr>
+      <p:sp>
+        <p:nvSpPr>
+          <p:cNvPr id="2" name="제목 1">
+            <a:extLst>
+              <a:ext uri="{FF2B5EF4-FFF2-40B4-BE49-F238E27FC236}">
+                <a16:creationId xmlns:a16="http://schemas.microsoft.com/office/drawing/2014/main" id="{D743DEC8-DB4B-3911-98B9-1D0071F97151}"/>
+              </a:ext>
+            </a:extLst>
+          </p:cNvPr>
+          <p:cNvSpPr>
+            <a:spLocks noGrp="1"/>
+          </p:cNvSpPr>
+          <p:nvPr>
+            <p:ph type="title"/>
+          </p:nvPr>
+        </p:nvSpPr>
+        <p:spPr>
+          <a:solidFill>
+            <a:schemeClr val="tx1"/>
+          </a:solidFill>
+        </p:spPr>
+        <p:txBody>
+          <a:bodyPr>
+            <a:normAutofit/>
+          </a:bodyPr>
+          <a:lstStyle/>
+          <a:p>
+            <a:pPr algn="ctr"/>
+            <a:r>
+              <a:rPr lang="ko-KR" altLang="en-US" sz="3500" b="1" dirty="0" err="1">
+                <a:solidFill>
+                  <a:schemeClr val="bg1"/>
+                </a:solidFill>
+              </a:rPr>
+              <a:t>느낀점느낀느낀점</a:t>
+            </a:r>
+            <a:endParaRPr lang="ko-KR" altLang="en-US" sz="3500" b="1" dirty="0">
+              <a:solidFill>
+                <a:schemeClr val="bg1"/>
+              </a:solidFill>
+            </a:endParaRPr>
+          </a:p>
+        </p:txBody>
+      </p:sp>
+      <p:sp>
+        <p:nvSpPr>
+          <p:cNvPr id="3" name="내용 개체 틀 2">
+            <a:extLst>
+              <a:ext uri="{FF2B5EF4-FFF2-40B4-BE49-F238E27FC236}">
+                <a16:creationId xmlns:a16="http://schemas.microsoft.com/office/drawing/2014/main" id="{34C4EE67-9F49-23A0-BBC7-77ABA37EFF16}"/>
+              </a:ext>
+            </a:extLst>
+          </p:cNvPr>
+          <p:cNvSpPr>
+            <a:spLocks noGrp="1"/>
+          </p:cNvSpPr>
+          <p:nvPr>
+            <p:ph idx="1"/>
+          </p:nvPr>
+        </p:nvSpPr>
+        <p:spPr>
+          <a:xfrm>
+            <a:off x="3231481" y="1664871"/>
+            <a:ext cx="5729037" cy="1005807"/>
+          </a:xfrm>
+        </p:spPr>
+        <p:txBody>
+          <a:bodyPr>
+            <a:normAutofit fontScale="92500"/>
+          </a:bodyPr>
+          <a:lstStyle/>
+          <a:p>
+            <a:pPr marL="0" indent="0" algn="ctr">
+              <a:buNone/>
+            </a:pPr>
+            <a:r>
+              <a:rPr lang="ko-KR" altLang="en-US" sz="2300" b="1" dirty="0">
+                <a:solidFill>
+                  <a:schemeClr val="bg1"/>
+                </a:solidFill>
+              </a:rPr>
+              <a:t>패킷 트레이서가 많이 자료가 없어서</a:t>
+            </a:r>
+            <a:endParaRPr lang="en-US" altLang="ko-KR" sz="2300" b="1" dirty="0">
+              <a:solidFill>
+                <a:schemeClr val="bg1"/>
+              </a:solidFill>
+            </a:endParaRPr>
+          </a:p>
+          <a:p>
+            <a:pPr marL="0" indent="0">
+              <a:buNone/>
+            </a:pPr>
+            <a:r>
+              <a:rPr lang="ko-KR" altLang="en-US" sz="2300" b="1" dirty="0">
+                <a:solidFill>
+                  <a:schemeClr val="bg1"/>
+                </a:solidFill>
+              </a:rPr>
+              <a:t>원하는 장비를 배치하는데 있어 많이 힘들었다</a:t>
+            </a:r>
+            <a:r>
+              <a:rPr lang="en-US" altLang="ko-KR" sz="2300" b="1" dirty="0">
+                <a:solidFill>
+                  <a:schemeClr val="bg1"/>
+                </a:solidFill>
+              </a:rPr>
+              <a:t>.</a:t>
+            </a:r>
+          </a:p>
+        </p:txBody>
+      </p:sp>
+      <p:pic>
+        <p:nvPicPr>
+          <p:cNvPr id="5" name="그림 4">
+            <a:extLst>
+              <a:ext uri="{FF2B5EF4-FFF2-40B4-BE49-F238E27FC236}">
+                <a16:creationId xmlns:a16="http://schemas.microsoft.com/office/drawing/2014/main" id="{BBF2DCF0-AC23-AC10-7FCD-5319F53659BD}"/>
+              </a:ext>
+            </a:extLst>
+          </p:cNvPr>
+          <p:cNvPicPr>
+            <a:picLocks noChangeAspect="1"/>
+          </p:cNvPicPr>
+          <p:nvPr/>
+        </p:nvPicPr>
+        <p:blipFill>
+          <a:blip r:embed="rId2"/>
+          <a:stretch>
+            <a:fillRect/>
+          </a:stretch>
+        </p:blipFill>
+        <p:spPr>
+          <a:xfrm>
+            <a:off x="3971401" y="2670678"/>
+            <a:ext cx="4249196" cy="4020392"/>
+          </a:xfrm>
+          <a:prstGeom prst="rect">
+            <a:avLst/>
+          </a:prstGeom>
+        </p:spPr>
+      </p:pic>
+    </p:spTree>
+    <p:extLst>
+      <p:ext uri="{BB962C8B-B14F-4D97-AF65-F5344CB8AC3E}">
+        <p14:creationId xmlns:p14="http://schemas.microsoft.com/office/powerpoint/2010/main" val="3609340937"/>
+      </p:ext>
+    </p:extLst>
+  </p:cSld>
+  <p:clrMapOvr>
+    <a:masterClrMapping/>
+  </p:clrMapOvr>
+</p:sld>
+</file>
+
 <file path=ppt/slides/slide2.xml><?xml version="1.0" encoding="utf-8"?>
 <p:sld xmlns:a="http://schemas.openxmlformats.org/drawingml/2006/main" xmlns:r="http://schemas.openxmlformats.org/officeDocument/2006/relationships" xmlns:p="http://schemas.openxmlformats.org/presentationml/2006/main">
   <p:cSld>
@@ -3551,31 +5073,35 @@
           </a:p>
         </p:txBody>
       </p:sp>
-      <p:sp>
-        <p:nvSpPr>
-          <p:cNvPr id="3" name="내용 개체 틀 2">
-            <a:extLst>
-              <a:ext uri="{FF2B5EF4-FFF2-40B4-BE49-F238E27FC236}">
-                <a16:creationId xmlns:a16="http://schemas.microsoft.com/office/drawing/2014/main" id="{34C4EE67-9F49-23A0-BBC7-77ABA37EFF16}"/>
-              </a:ext>
-            </a:extLst>
-          </p:cNvPr>
-          <p:cNvSpPr>
-            <a:spLocks noGrp="1"/>
-          </p:cNvSpPr>
+      <p:pic>
+        <p:nvPicPr>
+          <p:cNvPr id="5" name="내용 개체 틀 4">
+            <a:extLst>
+              <a:ext uri="{FF2B5EF4-FFF2-40B4-BE49-F238E27FC236}">
+                <a16:creationId xmlns:a16="http://schemas.microsoft.com/office/drawing/2014/main" id="{21F7AF78-8F30-5814-AF6A-B900B1862553}"/>
+              </a:ext>
+            </a:extLst>
+          </p:cNvPr>
+          <p:cNvPicPr>
+            <a:picLocks noGrp="1" noChangeAspect="1"/>
+          </p:cNvPicPr>
           <p:nvPr>
             <p:ph idx="1"/>
           </p:nvPr>
-        </p:nvSpPr>
-        <p:spPr/>
-        <p:txBody>
-          <a:bodyPr/>
-          <a:lstStyle/>
-          <a:p>
-            <a:endParaRPr lang="ko-KR" altLang="en-US" dirty="0"/>
-          </a:p>
-        </p:txBody>
-      </p:sp>
+        </p:nvPicPr>
+        <p:blipFill>
+          <a:blip r:embed="rId2"/>
+          <a:stretch>
+            <a:fillRect/>
+          </a:stretch>
+        </p:blipFill>
+        <p:spPr>
+          <a:xfrm>
+            <a:off x="1869148" y="1825625"/>
+            <a:ext cx="8453704" cy="4351338"/>
+          </a:xfrm>
+        </p:spPr>
+      </p:pic>
     </p:spTree>
     <p:extLst>
       <p:ext uri="{BB962C8B-B14F-4D97-AF65-F5344CB8AC3E}">
@@ -3648,8 +5174,21 @@
                   <a:schemeClr val="bg1"/>
                 </a:solidFill>
               </a:rPr>
-              <a:t>사용한 장비</a:t>
-            </a:r>
+              <a:t>사용한 장비 </a:t>
+            </a:r>
+            <a:r>
+              <a:rPr lang="en-US" altLang="ko-KR" sz="3500" b="1" dirty="0">
+                <a:solidFill>
+                  <a:schemeClr val="bg1"/>
+                </a:solidFill>
+              </a:rPr>
+              <a:t>: Multiuser</a:t>
+            </a:r>
+            <a:endParaRPr lang="ko-KR" altLang="en-US" sz="3500" b="1" dirty="0">
+              <a:solidFill>
+                <a:schemeClr val="bg1"/>
+              </a:solidFill>
+            </a:endParaRPr>
           </a:p>
         </p:txBody>
       </p:sp>
@@ -3671,17 +5210,1574 @@
         </p:nvSpPr>
         <p:spPr/>
         <p:txBody>
-          <a:bodyPr/>
-          <a:lstStyle/>
-          <a:p>
-            <a:endParaRPr lang="ko-KR" altLang="en-US" dirty="0"/>
-          </a:p>
-        </p:txBody>
-      </p:sp>
+          <a:bodyPr>
+            <a:normAutofit/>
+          </a:bodyPr>
+          <a:lstStyle/>
+          <a:p>
+            <a:pPr marL="0" indent="0" algn="ctr">
+              <a:buNone/>
+            </a:pPr>
+            <a:r>
+              <a:rPr lang="en-US" altLang="ko-KR" sz="2500" b="1" dirty="0">
+                <a:solidFill>
+                  <a:schemeClr val="bg1"/>
+                </a:solidFill>
+              </a:rPr>
+              <a:t>Multiuser</a:t>
+            </a:r>
+            <a:r>
+              <a:rPr lang="ko-KR" altLang="en-US" sz="2500" b="1" dirty="0">
+                <a:solidFill>
+                  <a:schemeClr val="bg1"/>
+                </a:solidFill>
+              </a:rPr>
+              <a:t>를 통해서 </a:t>
+            </a:r>
+            <a:r>
+              <a:rPr lang="en-US" altLang="ko-KR" sz="2500" b="1" dirty="0">
+                <a:solidFill>
+                  <a:schemeClr val="bg1"/>
+                </a:solidFill>
+              </a:rPr>
+              <a:t>Client</a:t>
+            </a:r>
+            <a:r>
+              <a:rPr lang="ko-KR" altLang="en-US" sz="2500" b="1" dirty="0">
+                <a:solidFill>
+                  <a:schemeClr val="bg1"/>
+                </a:solidFill>
+              </a:rPr>
+              <a:t> 파일 </a:t>
+            </a:r>
+            <a:r>
+              <a:rPr lang="en-US" altLang="ko-KR" sz="2500" b="1" dirty="0">
+                <a:solidFill>
+                  <a:schemeClr val="bg1"/>
+                </a:solidFill>
+              </a:rPr>
+              <a:t>, Server</a:t>
+            </a:r>
+            <a:r>
+              <a:rPr lang="ko-KR" altLang="en-US" sz="2500" b="1" dirty="0">
+                <a:solidFill>
+                  <a:schemeClr val="bg1"/>
+                </a:solidFill>
+              </a:rPr>
+              <a:t> 파일로 나누어 </a:t>
+            </a:r>
+            <a:r>
+              <a:rPr lang="en-US" altLang="ko-KR" sz="2500" b="1" dirty="0">
+                <a:solidFill>
+                  <a:schemeClr val="bg1"/>
+                </a:solidFill>
+              </a:rPr>
+              <a:t>2</a:t>
+            </a:r>
+            <a:r>
+              <a:rPr lang="ko-KR" altLang="en-US" sz="2500" b="1" dirty="0">
+                <a:solidFill>
+                  <a:schemeClr val="bg1"/>
+                </a:solidFill>
+              </a:rPr>
+              <a:t>가지 파일로 나누어 통신을 진행 하였습니다</a:t>
+            </a:r>
+            <a:r>
+              <a:rPr lang="en-US" altLang="ko-KR" sz="2500" b="1" dirty="0">
+                <a:solidFill>
+                  <a:schemeClr val="bg1"/>
+                </a:solidFill>
+              </a:rPr>
+              <a:t>.</a:t>
+            </a:r>
+            <a:r>
+              <a:rPr lang="ko-KR" altLang="en-US" sz="2500" b="1" dirty="0">
+                <a:solidFill>
+                  <a:schemeClr val="bg1"/>
+                </a:solidFill>
+              </a:rPr>
+              <a:t> </a:t>
+            </a:r>
+          </a:p>
+        </p:txBody>
+      </p:sp>
+      <p:pic>
+        <p:nvPicPr>
+          <p:cNvPr id="10" name="그림 9">
+            <a:extLst>
+              <a:ext uri="{FF2B5EF4-FFF2-40B4-BE49-F238E27FC236}">
+                <a16:creationId xmlns:a16="http://schemas.microsoft.com/office/drawing/2014/main" id="{9E8B7C6C-D767-299C-463E-1CF2F431F8A6}"/>
+              </a:ext>
+            </a:extLst>
+          </p:cNvPr>
+          <p:cNvPicPr>
+            <a:picLocks noChangeAspect="1"/>
+          </p:cNvPicPr>
+          <p:nvPr/>
+        </p:nvPicPr>
+        <p:blipFill>
+          <a:blip r:embed="rId2"/>
+          <a:stretch>
+            <a:fillRect/>
+          </a:stretch>
+        </p:blipFill>
+        <p:spPr>
+          <a:xfrm>
+            <a:off x="454741" y="2830626"/>
+            <a:ext cx="4704428" cy="3274485"/>
+          </a:xfrm>
+          <a:prstGeom prst="rect">
+            <a:avLst/>
+          </a:prstGeom>
+        </p:spPr>
+      </p:pic>
+      <p:pic>
+        <p:nvPicPr>
+          <p:cNvPr id="12" name="그림 11">
+            <a:extLst>
+              <a:ext uri="{FF2B5EF4-FFF2-40B4-BE49-F238E27FC236}">
+                <a16:creationId xmlns:a16="http://schemas.microsoft.com/office/drawing/2014/main" id="{3EA500B2-4D39-645F-A018-1D9908FA1E24}"/>
+              </a:ext>
+            </a:extLst>
+          </p:cNvPr>
+          <p:cNvPicPr>
+            <a:picLocks noChangeAspect="1"/>
+          </p:cNvPicPr>
+          <p:nvPr/>
+        </p:nvPicPr>
+        <p:blipFill>
+          <a:blip r:embed="rId3"/>
+          <a:stretch>
+            <a:fillRect/>
+          </a:stretch>
+        </p:blipFill>
+        <p:spPr>
+          <a:xfrm>
+            <a:off x="5732206" y="2830626"/>
+            <a:ext cx="6148334" cy="3265835"/>
+          </a:xfrm>
+          <a:prstGeom prst="rect">
+            <a:avLst/>
+          </a:prstGeom>
+        </p:spPr>
+      </p:pic>
     </p:spTree>
     <p:extLst>
       <p:ext uri="{BB962C8B-B14F-4D97-AF65-F5344CB8AC3E}">
-        <p14:creationId xmlns:p14="http://schemas.microsoft.com/office/powerpoint/2010/main" val="2772242629"/>
+        <p14:creationId xmlns:p14="http://schemas.microsoft.com/office/powerpoint/2010/main" val="3348577038"/>
+      </p:ext>
+    </p:extLst>
+  </p:cSld>
+  <p:clrMapOvr>
+    <a:masterClrMapping/>
+  </p:clrMapOvr>
+</p:sld>
+</file>
+
+<file path=ppt/slides/slide4.xml><?xml version="1.0" encoding="utf-8"?>
+<p:sld xmlns:a="http://schemas.openxmlformats.org/drawingml/2006/main" xmlns:r="http://schemas.openxmlformats.org/officeDocument/2006/relationships" xmlns:p="http://schemas.openxmlformats.org/presentationml/2006/main">
+  <p:cSld>
+    <p:bg>
+      <p:bgPr>
+        <a:solidFill>
+          <a:schemeClr val="tx1"/>
+        </a:solidFill>
+        <a:effectLst/>
+      </p:bgPr>
+    </p:bg>
+    <p:spTree>
+      <p:nvGrpSpPr>
+        <p:cNvPr id="1" name=""/>
+        <p:cNvGrpSpPr/>
+        <p:nvPr/>
+      </p:nvGrpSpPr>
+      <p:grpSpPr>
+        <a:xfrm>
+          <a:off x="0" y="0"/>
+          <a:ext cx="0" cy="0"/>
+          <a:chOff x="0" y="0"/>
+          <a:chExt cx="0" cy="0"/>
+        </a:xfrm>
+      </p:grpSpPr>
+      <p:sp>
+        <p:nvSpPr>
+          <p:cNvPr id="2" name="제목 1">
+            <a:extLst>
+              <a:ext uri="{FF2B5EF4-FFF2-40B4-BE49-F238E27FC236}">
+                <a16:creationId xmlns:a16="http://schemas.microsoft.com/office/drawing/2014/main" id="{D743DEC8-DB4B-3911-98B9-1D0071F97151}"/>
+              </a:ext>
+            </a:extLst>
+          </p:cNvPr>
+          <p:cNvSpPr>
+            <a:spLocks noGrp="1"/>
+          </p:cNvSpPr>
+          <p:nvPr>
+            <p:ph type="title"/>
+          </p:nvPr>
+        </p:nvSpPr>
+        <p:spPr>
+          <a:solidFill>
+            <a:schemeClr val="tx1"/>
+          </a:solidFill>
+        </p:spPr>
+        <p:txBody>
+          <a:bodyPr>
+            <a:normAutofit/>
+          </a:bodyPr>
+          <a:lstStyle/>
+          <a:p>
+            <a:pPr algn="ctr"/>
+            <a:r>
+              <a:rPr lang="ko-KR" altLang="en-US" sz="3500" b="1" dirty="0">
+                <a:solidFill>
+                  <a:schemeClr val="bg1"/>
+                </a:solidFill>
+              </a:rPr>
+              <a:t>사용한 장비 </a:t>
+            </a:r>
+            <a:r>
+              <a:rPr lang="en-US" altLang="ko-KR" sz="3500" b="1" dirty="0">
+                <a:solidFill>
+                  <a:schemeClr val="bg1"/>
+                </a:solidFill>
+              </a:rPr>
+              <a:t>: ASA 5505</a:t>
+            </a:r>
+            <a:endParaRPr lang="ko-KR" altLang="en-US" sz="3500" b="1" dirty="0">
+              <a:solidFill>
+                <a:schemeClr val="bg1"/>
+              </a:solidFill>
+            </a:endParaRPr>
+          </a:p>
+        </p:txBody>
+      </p:sp>
+      <p:sp>
+        <p:nvSpPr>
+          <p:cNvPr id="3" name="내용 개체 틀 2">
+            <a:extLst>
+              <a:ext uri="{FF2B5EF4-FFF2-40B4-BE49-F238E27FC236}">
+                <a16:creationId xmlns:a16="http://schemas.microsoft.com/office/drawing/2014/main" id="{34C4EE67-9F49-23A0-BBC7-77ABA37EFF16}"/>
+              </a:ext>
+            </a:extLst>
+          </p:cNvPr>
+          <p:cNvSpPr>
+            <a:spLocks noGrp="1"/>
+          </p:cNvSpPr>
+          <p:nvPr>
+            <p:ph idx="1"/>
+          </p:nvPr>
+        </p:nvSpPr>
+        <p:spPr/>
+        <p:txBody>
+          <a:bodyPr>
+            <a:normAutofit/>
+          </a:bodyPr>
+          <a:lstStyle/>
+          <a:p>
+            <a:pPr marL="0" indent="0" algn="ctr">
+              <a:buNone/>
+            </a:pPr>
+            <a:r>
+              <a:rPr lang="en-US" altLang="ko-KR" sz="2300" b="1" dirty="0">
+                <a:solidFill>
+                  <a:schemeClr val="bg1"/>
+                </a:solidFill>
+              </a:rPr>
+              <a:t>ASA 5505</a:t>
+            </a:r>
+            <a:r>
+              <a:rPr lang="ko-KR" altLang="en-US" sz="2300" b="1" dirty="0">
+                <a:solidFill>
+                  <a:schemeClr val="bg1"/>
+                </a:solidFill>
+              </a:rPr>
+              <a:t>를 사용하여서 </a:t>
+            </a:r>
+            <a:r>
+              <a:rPr lang="en-US" altLang="ko-KR" sz="2300" b="1" dirty="0">
+                <a:solidFill>
+                  <a:schemeClr val="bg1"/>
+                </a:solidFill>
+              </a:rPr>
+              <a:t>inside network</a:t>
+            </a:r>
+            <a:r>
+              <a:rPr lang="ko-KR" altLang="en-US" sz="2300" b="1" dirty="0">
+                <a:solidFill>
+                  <a:schemeClr val="bg1"/>
+                </a:solidFill>
+              </a:rPr>
+              <a:t>에서는 </a:t>
+            </a:r>
+            <a:r>
+              <a:rPr lang="en-US" altLang="ko-KR" sz="2300" b="1" dirty="0">
+                <a:solidFill>
+                  <a:schemeClr val="bg1"/>
+                </a:solidFill>
+              </a:rPr>
+              <a:t>DNS,HTTP, DHCP </a:t>
+            </a:r>
+          </a:p>
+          <a:p>
+            <a:pPr marL="0" indent="0" algn="ctr">
+              <a:buNone/>
+            </a:pPr>
+            <a:r>
+              <a:rPr lang="ko-KR" altLang="en-US" sz="2300" b="1" dirty="0">
+                <a:solidFill>
+                  <a:schemeClr val="bg1"/>
+                </a:solidFill>
+              </a:rPr>
+              <a:t>서버를 생성하여 </a:t>
+            </a:r>
+            <a:r>
+              <a:rPr lang="en-US" altLang="ko-KR" sz="2300" b="1" dirty="0">
+                <a:solidFill>
+                  <a:schemeClr val="bg1"/>
+                </a:solidFill>
+              </a:rPr>
+              <a:t>70.0.0.0/24</a:t>
+            </a:r>
+            <a:r>
+              <a:rPr lang="ko-KR" altLang="en-US" sz="2300" b="1" dirty="0">
+                <a:solidFill>
+                  <a:schemeClr val="bg1"/>
+                </a:solidFill>
+              </a:rPr>
+              <a:t> 네트워크에서는 </a:t>
+            </a:r>
+            <a:r>
+              <a:rPr lang="en-US" altLang="ko-KR" sz="2300" b="1" dirty="0">
+                <a:solidFill>
+                  <a:schemeClr val="bg1"/>
+                </a:solidFill>
+              </a:rPr>
+              <a:t>DNS </a:t>
+            </a:r>
+            <a:r>
+              <a:rPr lang="ko-KR" altLang="en-US" sz="2300" b="1" dirty="0">
+                <a:solidFill>
+                  <a:schemeClr val="bg1"/>
+                </a:solidFill>
+              </a:rPr>
+              <a:t>접속을 차단 시키는</a:t>
+            </a:r>
+            <a:endParaRPr lang="en-US" altLang="ko-KR" sz="2300" b="1" dirty="0">
+              <a:solidFill>
+                <a:schemeClr val="bg1"/>
+              </a:solidFill>
+            </a:endParaRPr>
+          </a:p>
+          <a:p>
+            <a:pPr marL="0" indent="0" algn="ctr">
+              <a:buNone/>
+            </a:pPr>
+            <a:r>
+              <a:rPr lang="en-US" altLang="ko-KR" sz="2300" b="1" dirty="0">
+                <a:solidFill>
+                  <a:schemeClr val="bg1"/>
+                </a:solidFill>
+              </a:rPr>
+              <a:t>ACL</a:t>
+            </a:r>
+            <a:r>
+              <a:rPr lang="ko-KR" altLang="en-US" sz="2300" b="1" dirty="0">
+                <a:solidFill>
+                  <a:schemeClr val="bg1"/>
+                </a:solidFill>
+              </a:rPr>
+              <a:t>을 설정하였습니다</a:t>
+            </a:r>
+            <a:r>
+              <a:rPr lang="en-US" altLang="ko-KR" sz="2300" b="1" dirty="0">
+                <a:solidFill>
+                  <a:schemeClr val="bg1"/>
+                </a:solidFill>
+              </a:rPr>
+              <a:t>.</a:t>
+            </a:r>
+            <a:r>
+              <a:rPr lang="ko-KR" altLang="en-US" sz="2300" b="1" dirty="0">
+                <a:solidFill>
+                  <a:schemeClr val="bg1"/>
+                </a:solidFill>
+              </a:rPr>
+              <a:t> </a:t>
+            </a:r>
+            <a:endParaRPr lang="en-US" altLang="ko-KR" sz="2300" b="1" dirty="0">
+              <a:solidFill>
+                <a:schemeClr val="bg1"/>
+              </a:solidFill>
+            </a:endParaRPr>
+          </a:p>
+          <a:p>
+            <a:pPr marL="0" indent="0" algn="ctr">
+              <a:buNone/>
+            </a:pPr>
+            <a:endParaRPr lang="en-US" altLang="ko-KR" sz="2300" b="1" dirty="0">
+              <a:solidFill>
+                <a:schemeClr val="bg1"/>
+              </a:solidFill>
+            </a:endParaRPr>
+          </a:p>
+        </p:txBody>
+      </p:sp>
+      <p:pic>
+        <p:nvPicPr>
+          <p:cNvPr id="5" name="그림 4">
+            <a:extLst>
+              <a:ext uri="{FF2B5EF4-FFF2-40B4-BE49-F238E27FC236}">
+                <a16:creationId xmlns:a16="http://schemas.microsoft.com/office/drawing/2014/main" id="{69A735E6-B7A9-591E-1E21-75FADE94859A}"/>
+              </a:ext>
+            </a:extLst>
+          </p:cNvPr>
+          <p:cNvPicPr>
+            <a:picLocks noChangeAspect="1"/>
+          </p:cNvPicPr>
+          <p:nvPr/>
+        </p:nvPicPr>
+        <p:blipFill>
+          <a:blip r:embed="rId2"/>
+          <a:stretch>
+            <a:fillRect/>
+          </a:stretch>
+        </p:blipFill>
+        <p:spPr>
+          <a:xfrm>
+            <a:off x="4984171" y="3180821"/>
+            <a:ext cx="2223658" cy="3498427"/>
+          </a:xfrm>
+          <a:prstGeom prst="rect">
+            <a:avLst/>
+          </a:prstGeom>
+        </p:spPr>
+      </p:pic>
+    </p:spTree>
+    <p:extLst>
+      <p:ext uri="{BB962C8B-B14F-4D97-AF65-F5344CB8AC3E}">
+        <p14:creationId xmlns:p14="http://schemas.microsoft.com/office/powerpoint/2010/main" val="2046522625"/>
+      </p:ext>
+    </p:extLst>
+  </p:cSld>
+  <p:clrMapOvr>
+    <a:masterClrMapping/>
+  </p:clrMapOvr>
+</p:sld>
+</file>
+
+<file path=ppt/slides/slide5.xml><?xml version="1.0" encoding="utf-8"?>
+<p:sld xmlns:a="http://schemas.openxmlformats.org/drawingml/2006/main" xmlns:r="http://schemas.openxmlformats.org/officeDocument/2006/relationships" xmlns:p="http://schemas.openxmlformats.org/presentationml/2006/main">
+  <p:cSld>
+    <p:bg>
+      <p:bgPr>
+        <a:solidFill>
+          <a:schemeClr val="tx1"/>
+        </a:solidFill>
+        <a:effectLst/>
+      </p:bgPr>
+    </p:bg>
+    <p:spTree>
+      <p:nvGrpSpPr>
+        <p:cNvPr id="1" name=""/>
+        <p:cNvGrpSpPr/>
+        <p:nvPr/>
+      </p:nvGrpSpPr>
+      <p:grpSpPr>
+        <a:xfrm>
+          <a:off x="0" y="0"/>
+          <a:ext cx="0" cy="0"/>
+          <a:chOff x="0" y="0"/>
+          <a:chExt cx="0" cy="0"/>
+        </a:xfrm>
+      </p:grpSpPr>
+      <p:sp>
+        <p:nvSpPr>
+          <p:cNvPr id="2" name="제목 1">
+            <a:extLst>
+              <a:ext uri="{FF2B5EF4-FFF2-40B4-BE49-F238E27FC236}">
+                <a16:creationId xmlns:a16="http://schemas.microsoft.com/office/drawing/2014/main" id="{D743DEC8-DB4B-3911-98B9-1D0071F97151}"/>
+              </a:ext>
+            </a:extLst>
+          </p:cNvPr>
+          <p:cNvSpPr>
+            <a:spLocks noGrp="1"/>
+          </p:cNvSpPr>
+          <p:nvPr>
+            <p:ph type="title"/>
+          </p:nvPr>
+        </p:nvSpPr>
+        <p:spPr>
+          <a:solidFill>
+            <a:schemeClr val="tx1"/>
+          </a:solidFill>
+        </p:spPr>
+        <p:txBody>
+          <a:bodyPr>
+            <a:normAutofit/>
+          </a:bodyPr>
+          <a:lstStyle/>
+          <a:p>
+            <a:pPr algn="ctr"/>
+            <a:r>
+              <a:rPr lang="ko-KR" altLang="en-US" sz="3500" b="1" dirty="0">
+                <a:solidFill>
+                  <a:schemeClr val="bg1"/>
+                </a:solidFill>
+              </a:rPr>
+              <a:t>사용한 장비 </a:t>
+            </a:r>
+            <a:r>
+              <a:rPr lang="en-US" altLang="ko-KR" sz="3500" b="1" dirty="0">
+                <a:solidFill>
+                  <a:schemeClr val="bg1"/>
+                </a:solidFill>
+              </a:rPr>
+              <a:t>: Cell Tower , Central Cell Office</a:t>
+            </a:r>
+            <a:endParaRPr lang="ko-KR" altLang="en-US" sz="3500" b="1" dirty="0">
+              <a:solidFill>
+                <a:schemeClr val="bg1"/>
+              </a:solidFill>
+            </a:endParaRPr>
+          </a:p>
+        </p:txBody>
+      </p:sp>
+      <p:sp>
+        <p:nvSpPr>
+          <p:cNvPr id="3" name="내용 개체 틀 2">
+            <a:extLst>
+              <a:ext uri="{FF2B5EF4-FFF2-40B4-BE49-F238E27FC236}">
+                <a16:creationId xmlns:a16="http://schemas.microsoft.com/office/drawing/2014/main" id="{34C4EE67-9F49-23A0-BBC7-77ABA37EFF16}"/>
+              </a:ext>
+            </a:extLst>
+          </p:cNvPr>
+          <p:cNvSpPr>
+            <a:spLocks noGrp="1"/>
+          </p:cNvSpPr>
+          <p:nvPr>
+            <p:ph idx="1"/>
+          </p:nvPr>
+        </p:nvSpPr>
+        <p:spPr/>
+        <p:txBody>
+          <a:bodyPr>
+            <a:normAutofit/>
+          </a:bodyPr>
+          <a:lstStyle/>
+          <a:p>
+            <a:pPr marL="0" indent="0" algn="ctr">
+              <a:buNone/>
+            </a:pPr>
+            <a:r>
+              <a:rPr lang="en-US" altLang="ko-KR" sz="2300" b="1" dirty="0">
+                <a:solidFill>
+                  <a:schemeClr val="bg1"/>
+                </a:solidFill>
+              </a:rPr>
+              <a:t>Cell Tower</a:t>
+            </a:r>
+            <a:r>
+              <a:rPr lang="ko-KR" altLang="en-US" sz="2300" b="1" dirty="0">
+                <a:solidFill>
+                  <a:schemeClr val="bg1"/>
+                </a:solidFill>
+              </a:rPr>
+              <a:t>와 </a:t>
+            </a:r>
+            <a:r>
+              <a:rPr lang="en-US" altLang="ko-KR" sz="2300" b="1" dirty="0">
+                <a:solidFill>
+                  <a:schemeClr val="bg1"/>
+                </a:solidFill>
+              </a:rPr>
+              <a:t>Central Cell Office</a:t>
+            </a:r>
+            <a:r>
+              <a:rPr lang="ko-KR" altLang="en-US" sz="2300" b="1" dirty="0">
+                <a:solidFill>
+                  <a:schemeClr val="bg1"/>
+                </a:solidFill>
+              </a:rPr>
+              <a:t>를 사용하여 </a:t>
+            </a:r>
+            <a:r>
+              <a:rPr lang="en-US" altLang="ko-KR" sz="2300" b="1" dirty="0">
+                <a:solidFill>
+                  <a:schemeClr val="bg1"/>
+                </a:solidFill>
+              </a:rPr>
+              <a:t>smartphone</a:t>
+            </a:r>
+            <a:r>
+              <a:rPr lang="ko-KR" altLang="en-US" sz="2300" b="1" dirty="0">
+                <a:solidFill>
+                  <a:schemeClr val="bg1"/>
+                </a:solidFill>
+              </a:rPr>
+              <a:t>에게</a:t>
+            </a:r>
+            <a:endParaRPr lang="en-US" altLang="ko-KR" sz="2300" b="1" dirty="0">
+              <a:solidFill>
+                <a:schemeClr val="bg1"/>
+              </a:solidFill>
+            </a:endParaRPr>
+          </a:p>
+          <a:p>
+            <a:pPr marL="0" indent="0" algn="ctr">
+              <a:buNone/>
+            </a:pPr>
+            <a:r>
+              <a:rPr lang="en-US" altLang="ko-KR" sz="2300" b="1" dirty="0">
+                <a:solidFill>
+                  <a:schemeClr val="bg1"/>
+                </a:solidFill>
+              </a:rPr>
+              <a:t>DHCP</a:t>
+            </a:r>
+            <a:r>
+              <a:rPr lang="ko-KR" altLang="en-US" sz="2300" b="1" dirty="0">
+                <a:solidFill>
+                  <a:schemeClr val="bg1"/>
+                </a:solidFill>
+              </a:rPr>
+              <a:t>로 </a:t>
+            </a:r>
+            <a:r>
+              <a:rPr lang="en-US" altLang="ko-KR" sz="2300" b="1" dirty="0">
+                <a:solidFill>
+                  <a:schemeClr val="bg1"/>
+                </a:solidFill>
+              </a:rPr>
+              <a:t>IP</a:t>
+            </a:r>
+            <a:r>
+              <a:rPr lang="ko-KR" altLang="en-US" sz="2300" b="1" dirty="0">
+                <a:solidFill>
+                  <a:schemeClr val="bg1"/>
+                </a:solidFill>
+              </a:rPr>
+              <a:t>를 부여하였습니다</a:t>
+            </a:r>
+            <a:r>
+              <a:rPr lang="en-US" altLang="ko-KR" sz="2300" b="1" dirty="0">
+                <a:solidFill>
+                  <a:schemeClr val="bg1"/>
+                </a:solidFill>
+              </a:rPr>
+              <a:t>.</a:t>
+            </a:r>
+          </a:p>
+        </p:txBody>
+      </p:sp>
+      <p:pic>
+        <p:nvPicPr>
+          <p:cNvPr id="6" name="그림 5">
+            <a:extLst>
+              <a:ext uri="{FF2B5EF4-FFF2-40B4-BE49-F238E27FC236}">
+                <a16:creationId xmlns:a16="http://schemas.microsoft.com/office/drawing/2014/main" id="{1025D935-A7DC-DB14-62B6-F6EAC17537E7}"/>
+              </a:ext>
+            </a:extLst>
+          </p:cNvPr>
+          <p:cNvPicPr>
+            <a:picLocks noChangeAspect="1"/>
+          </p:cNvPicPr>
+          <p:nvPr/>
+        </p:nvPicPr>
+        <p:blipFill>
+          <a:blip r:embed="rId2"/>
+          <a:stretch>
+            <a:fillRect/>
+          </a:stretch>
+        </p:blipFill>
+        <p:spPr>
+          <a:xfrm>
+            <a:off x="3009964" y="3213130"/>
+            <a:ext cx="6172071" cy="3098770"/>
+          </a:xfrm>
+          <a:prstGeom prst="rect">
+            <a:avLst/>
+          </a:prstGeom>
+        </p:spPr>
+      </p:pic>
+    </p:spTree>
+    <p:extLst>
+      <p:ext uri="{BB962C8B-B14F-4D97-AF65-F5344CB8AC3E}">
+        <p14:creationId xmlns:p14="http://schemas.microsoft.com/office/powerpoint/2010/main" val="692781224"/>
+      </p:ext>
+    </p:extLst>
+  </p:cSld>
+  <p:clrMapOvr>
+    <a:masterClrMapping/>
+  </p:clrMapOvr>
+</p:sld>
+</file>
+
+<file path=ppt/slides/slide6.xml><?xml version="1.0" encoding="utf-8"?>
+<p:sld xmlns:a="http://schemas.openxmlformats.org/drawingml/2006/main" xmlns:r="http://schemas.openxmlformats.org/officeDocument/2006/relationships" xmlns:p="http://schemas.openxmlformats.org/presentationml/2006/main">
+  <p:cSld>
+    <p:bg>
+      <p:bgPr>
+        <a:solidFill>
+          <a:schemeClr val="tx1"/>
+        </a:solidFill>
+        <a:effectLst/>
+      </p:bgPr>
+    </p:bg>
+    <p:spTree>
+      <p:nvGrpSpPr>
+        <p:cNvPr id="1" name=""/>
+        <p:cNvGrpSpPr/>
+        <p:nvPr/>
+      </p:nvGrpSpPr>
+      <p:grpSpPr>
+        <a:xfrm>
+          <a:off x="0" y="0"/>
+          <a:ext cx="0" cy="0"/>
+          <a:chOff x="0" y="0"/>
+          <a:chExt cx="0" cy="0"/>
+        </a:xfrm>
+      </p:grpSpPr>
+      <p:sp>
+        <p:nvSpPr>
+          <p:cNvPr id="2" name="제목 1">
+            <a:extLst>
+              <a:ext uri="{FF2B5EF4-FFF2-40B4-BE49-F238E27FC236}">
+                <a16:creationId xmlns:a16="http://schemas.microsoft.com/office/drawing/2014/main" id="{D743DEC8-DB4B-3911-98B9-1D0071F97151}"/>
+              </a:ext>
+            </a:extLst>
+          </p:cNvPr>
+          <p:cNvSpPr>
+            <a:spLocks noGrp="1"/>
+          </p:cNvSpPr>
+          <p:nvPr>
+            <p:ph type="title"/>
+          </p:nvPr>
+        </p:nvSpPr>
+        <p:spPr>
+          <a:solidFill>
+            <a:schemeClr val="tx1"/>
+          </a:solidFill>
+        </p:spPr>
+        <p:txBody>
+          <a:bodyPr>
+            <a:normAutofit/>
+          </a:bodyPr>
+          <a:lstStyle/>
+          <a:p>
+            <a:pPr algn="ctr"/>
+            <a:r>
+              <a:rPr lang="ko-KR" altLang="en-US" sz="3500" b="1" dirty="0">
+                <a:solidFill>
+                  <a:schemeClr val="bg1"/>
+                </a:solidFill>
+              </a:rPr>
+              <a:t>사용한 장비 </a:t>
+            </a:r>
+            <a:r>
+              <a:rPr lang="en-US" altLang="ko-KR" sz="3500" b="1" dirty="0">
+                <a:solidFill>
+                  <a:schemeClr val="bg1"/>
+                </a:solidFill>
+              </a:rPr>
+              <a:t>: </a:t>
+            </a:r>
+            <a:r>
+              <a:rPr lang="en-US" altLang="ko-KR" sz="3500" b="1" dirty="0" err="1">
+                <a:solidFill>
+                  <a:schemeClr val="bg1"/>
+                </a:solidFill>
+              </a:rPr>
+              <a:t>HomeRouter</a:t>
+            </a:r>
+            <a:r>
+              <a:rPr lang="en-US" altLang="ko-KR" sz="3500" b="1" dirty="0">
+                <a:solidFill>
+                  <a:schemeClr val="bg1"/>
+                </a:solidFill>
+              </a:rPr>
+              <a:t>-PT-AC</a:t>
+            </a:r>
+            <a:endParaRPr lang="ko-KR" altLang="en-US" sz="3500" b="1" dirty="0">
+              <a:solidFill>
+                <a:schemeClr val="bg1"/>
+              </a:solidFill>
+            </a:endParaRPr>
+          </a:p>
+        </p:txBody>
+      </p:sp>
+      <p:sp>
+        <p:nvSpPr>
+          <p:cNvPr id="3" name="내용 개체 틀 2">
+            <a:extLst>
+              <a:ext uri="{FF2B5EF4-FFF2-40B4-BE49-F238E27FC236}">
+                <a16:creationId xmlns:a16="http://schemas.microsoft.com/office/drawing/2014/main" id="{34C4EE67-9F49-23A0-BBC7-77ABA37EFF16}"/>
+              </a:ext>
+            </a:extLst>
+          </p:cNvPr>
+          <p:cNvSpPr>
+            <a:spLocks noGrp="1"/>
+          </p:cNvSpPr>
+          <p:nvPr>
+            <p:ph idx="1"/>
+          </p:nvPr>
+        </p:nvSpPr>
+        <p:spPr/>
+        <p:txBody>
+          <a:bodyPr>
+            <a:normAutofit/>
+          </a:bodyPr>
+          <a:lstStyle/>
+          <a:p>
+            <a:pPr marL="0" indent="0" algn="ctr">
+              <a:buNone/>
+            </a:pPr>
+            <a:r>
+              <a:rPr lang="en-US" altLang="ko-KR" sz="2300" b="1" dirty="0" err="1">
+                <a:solidFill>
+                  <a:schemeClr val="bg1"/>
+                </a:solidFill>
+              </a:rPr>
+              <a:t>HomeRouter</a:t>
+            </a:r>
+            <a:r>
+              <a:rPr lang="en-US" altLang="ko-KR" sz="2300" b="1" dirty="0">
+                <a:solidFill>
+                  <a:schemeClr val="bg1"/>
+                </a:solidFill>
+              </a:rPr>
+              <a:t>-PT-AC</a:t>
+            </a:r>
+            <a:r>
+              <a:rPr lang="ko-KR" altLang="en-US" sz="2300" b="1" dirty="0">
+                <a:solidFill>
+                  <a:schemeClr val="bg1"/>
+                </a:solidFill>
+              </a:rPr>
+              <a:t>을 사용하여 </a:t>
+            </a:r>
+            <a:r>
+              <a:rPr lang="en-US" altLang="ko-KR" sz="2300" b="1" dirty="0">
+                <a:solidFill>
+                  <a:schemeClr val="bg1"/>
+                </a:solidFill>
+              </a:rPr>
+              <a:t>PC</a:t>
+            </a:r>
+            <a:r>
+              <a:rPr lang="ko-KR" altLang="en-US" sz="2300" b="1" dirty="0">
+                <a:solidFill>
+                  <a:schemeClr val="bg1"/>
+                </a:solidFill>
+              </a:rPr>
+              <a:t>에게 각각 </a:t>
+            </a:r>
+            <a:r>
+              <a:rPr lang="en-US" altLang="ko-KR" sz="2300" b="1" dirty="0">
+                <a:solidFill>
+                  <a:schemeClr val="bg1"/>
+                </a:solidFill>
+              </a:rPr>
+              <a:t>DHCP</a:t>
+            </a:r>
+            <a:r>
+              <a:rPr lang="ko-KR" altLang="en-US" sz="2300" b="1" dirty="0">
+                <a:solidFill>
+                  <a:schemeClr val="bg1"/>
+                </a:solidFill>
+              </a:rPr>
+              <a:t>를 통해서 </a:t>
+            </a:r>
+            <a:r>
+              <a:rPr lang="en-US" altLang="ko-KR" sz="2300" b="1" dirty="0">
+                <a:solidFill>
+                  <a:schemeClr val="bg1"/>
+                </a:solidFill>
+              </a:rPr>
+              <a:t>IP</a:t>
+            </a:r>
+            <a:r>
+              <a:rPr lang="ko-KR" altLang="en-US" sz="2300" b="1" dirty="0">
+                <a:solidFill>
+                  <a:schemeClr val="bg1"/>
+                </a:solidFill>
+              </a:rPr>
+              <a:t>를 부여하였습니다</a:t>
+            </a:r>
+            <a:r>
+              <a:rPr lang="en-US" altLang="ko-KR" sz="2300" b="1" dirty="0">
+                <a:solidFill>
+                  <a:schemeClr val="bg1"/>
+                </a:solidFill>
+              </a:rPr>
+              <a:t>. </a:t>
+            </a:r>
+            <a:r>
+              <a:rPr lang="ko-KR" altLang="en-US" sz="2300" b="1" dirty="0">
+                <a:solidFill>
+                  <a:schemeClr val="bg1"/>
+                </a:solidFill>
+              </a:rPr>
+              <a:t>또한 </a:t>
+            </a:r>
+            <a:r>
+              <a:rPr lang="en-US" altLang="ko-KR" sz="2300" b="1" dirty="0" err="1">
+                <a:solidFill>
+                  <a:schemeClr val="bg1"/>
+                </a:solidFill>
+              </a:rPr>
+              <a:t>tacacs</a:t>
+            </a:r>
+            <a:r>
+              <a:rPr lang="ko-KR" altLang="en-US" sz="2300" b="1" dirty="0">
+                <a:solidFill>
+                  <a:schemeClr val="bg1"/>
+                </a:solidFill>
+              </a:rPr>
+              <a:t>를 이용하여서 </a:t>
+            </a:r>
+            <a:r>
+              <a:rPr lang="en-US" altLang="ko-KR" sz="2300" b="1" dirty="0">
+                <a:solidFill>
+                  <a:schemeClr val="bg1"/>
+                </a:solidFill>
+              </a:rPr>
+              <a:t>WPA2-Enterprise </a:t>
+            </a:r>
+            <a:r>
+              <a:rPr lang="ko-KR" altLang="en-US" sz="2300" b="1" dirty="0">
+                <a:solidFill>
+                  <a:schemeClr val="bg1"/>
+                </a:solidFill>
+              </a:rPr>
+              <a:t>설정을 진행하여</a:t>
+            </a:r>
+            <a:endParaRPr lang="en-US" altLang="ko-KR" sz="2300" b="1" dirty="0">
+              <a:solidFill>
+                <a:schemeClr val="bg1"/>
+              </a:solidFill>
+            </a:endParaRPr>
+          </a:p>
+          <a:p>
+            <a:pPr marL="0" indent="0" algn="ctr">
+              <a:buNone/>
+            </a:pPr>
+            <a:r>
+              <a:rPr lang="ko-KR" altLang="en-US" sz="2300" b="1" dirty="0">
+                <a:solidFill>
+                  <a:schemeClr val="bg1"/>
+                </a:solidFill>
+              </a:rPr>
+              <a:t>보안성을 더 강화 하였습니다</a:t>
+            </a:r>
+            <a:r>
+              <a:rPr lang="en-US" altLang="ko-KR" sz="2300" b="1" dirty="0">
+                <a:solidFill>
+                  <a:schemeClr val="bg1"/>
+                </a:solidFill>
+              </a:rPr>
+              <a:t>.</a:t>
+            </a:r>
+            <a:r>
+              <a:rPr lang="ko-KR" altLang="en-US" sz="2300" b="1" dirty="0">
+                <a:solidFill>
+                  <a:schemeClr val="bg1"/>
+                </a:solidFill>
+              </a:rPr>
+              <a:t> </a:t>
+            </a:r>
+            <a:endParaRPr lang="en-US" altLang="ko-KR" sz="2300" b="1" dirty="0">
+              <a:solidFill>
+                <a:schemeClr val="bg1"/>
+              </a:solidFill>
+            </a:endParaRPr>
+          </a:p>
+        </p:txBody>
+      </p:sp>
+      <p:pic>
+        <p:nvPicPr>
+          <p:cNvPr id="5" name="그림 4">
+            <a:extLst>
+              <a:ext uri="{FF2B5EF4-FFF2-40B4-BE49-F238E27FC236}">
+                <a16:creationId xmlns:a16="http://schemas.microsoft.com/office/drawing/2014/main" id="{DBAF6F71-8CA9-4CAE-31B2-83CE91BCD3CC}"/>
+              </a:ext>
+            </a:extLst>
+          </p:cNvPr>
+          <p:cNvPicPr>
+            <a:picLocks noChangeAspect="1"/>
+          </p:cNvPicPr>
+          <p:nvPr/>
+        </p:nvPicPr>
+        <p:blipFill>
+          <a:blip r:embed="rId2"/>
+          <a:stretch>
+            <a:fillRect/>
+          </a:stretch>
+        </p:blipFill>
+        <p:spPr>
+          <a:xfrm>
+            <a:off x="2960902" y="3055373"/>
+            <a:ext cx="6270195" cy="3713808"/>
+          </a:xfrm>
+          <a:prstGeom prst="rect">
+            <a:avLst/>
+          </a:prstGeom>
+        </p:spPr>
+      </p:pic>
+    </p:spTree>
+    <p:extLst>
+      <p:ext uri="{BB962C8B-B14F-4D97-AF65-F5344CB8AC3E}">
+        <p14:creationId xmlns:p14="http://schemas.microsoft.com/office/powerpoint/2010/main" val="2634301375"/>
+      </p:ext>
+    </p:extLst>
+  </p:cSld>
+  <p:clrMapOvr>
+    <a:masterClrMapping/>
+  </p:clrMapOvr>
+</p:sld>
+</file>
+
+<file path=ppt/slides/slide7.xml><?xml version="1.0" encoding="utf-8"?>
+<p:sld xmlns:a="http://schemas.openxmlformats.org/drawingml/2006/main" xmlns:r="http://schemas.openxmlformats.org/officeDocument/2006/relationships" xmlns:p="http://schemas.openxmlformats.org/presentationml/2006/main">
+  <p:cSld>
+    <p:bg>
+      <p:bgPr>
+        <a:solidFill>
+          <a:schemeClr val="tx1"/>
+        </a:solidFill>
+        <a:effectLst/>
+      </p:bgPr>
+    </p:bg>
+    <p:spTree>
+      <p:nvGrpSpPr>
+        <p:cNvPr id="1" name=""/>
+        <p:cNvGrpSpPr/>
+        <p:nvPr/>
+      </p:nvGrpSpPr>
+      <p:grpSpPr>
+        <a:xfrm>
+          <a:off x="0" y="0"/>
+          <a:ext cx="0" cy="0"/>
+          <a:chOff x="0" y="0"/>
+          <a:chExt cx="0" cy="0"/>
+        </a:xfrm>
+      </p:grpSpPr>
+      <p:sp>
+        <p:nvSpPr>
+          <p:cNvPr id="2" name="제목 1">
+            <a:extLst>
+              <a:ext uri="{FF2B5EF4-FFF2-40B4-BE49-F238E27FC236}">
+                <a16:creationId xmlns:a16="http://schemas.microsoft.com/office/drawing/2014/main" id="{D743DEC8-DB4B-3911-98B9-1D0071F97151}"/>
+              </a:ext>
+            </a:extLst>
+          </p:cNvPr>
+          <p:cNvSpPr>
+            <a:spLocks noGrp="1"/>
+          </p:cNvSpPr>
+          <p:nvPr>
+            <p:ph type="title"/>
+          </p:nvPr>
+        </p:nvSpPr>
+        <p:spPr>
+          <a:solidFill>
+            <a:schemeClr val="tx1"/>
+          </a:solidFill>
+        </p:spPr>
+        <p:txBody>
+          <a:bodyPr>
+            <a:normAutofit/>
+          </a:bodyPr>
+          <a:lstStyle/>
+          <a:p>
+            <a:pPr algn="ctr"/>
+            <a:r>
+              <a:rPr lang="en-US" altLang="ko-KR" sz="3500" b="1" dirty="0">
+                <a:solidFill>
+                  <a:schemeClr val="bg1"/>
+                </a:solidFill>
+              </a:rPr>
+              <a:t>Client Center</a:t>
+            </a:r>
+            <a:endParaRPr lang="ko-KR" altLang="en-US" sz="3500" b="1" dirty="0">
+              <a:solidFill>
+                <a:schemeClr val="bg1"/>
+              </a:solidFill>
+            </a:endParaRPr>
+          </a:p>
+        </p:txBody>
+      </p:sp>
+      <p:sp>
+        <p:nvSpPr>
+          <p:cNvPr id="3" name="내용 개체 틀 2">
+            <a:extLst>
+              <a:ext uri="{FF2B5EF4-FFF2-40B4-BE49-F238E27FC236}">
+                <a16:creationId xmlns:a16="http://schemas.microsoft.com/office/drawing/2014/main" id="{34C4EE67-9F49-23A0-BBC7-77ABA37EFF16}"/>
+              </a:ext>
+            </a:extLst>
+          </p:cNvPr>
+          <p:cNvSpPr>
+            <a:spLocks noGrp="1"/>
+          </p:cNvSpPr>
+          <p:nvPr>
+            <p:ph idx="1"/>
+          </p:nvPr>
+        </p:nvSpPr>
+        <p:spPr>
+          <a:xfrm>
+            <a:off x="838200" y="1825625"/>
+            <a:ext cx="10515600" cy="1325563"/>
+          </a:xfrm>
+        </p:spPr>
+        <p:txBody>
+          <a:bodyPr>
+            <a:normAutofit/>
+          </a:bodyPr>
+          <a:lstStyle/>
+          <a:p>
+            <a:pPr marL="0" indent="0" algn="ctr">
+              <a:buNone/>
+            </a:pPr>
+            <a:r>
+              <a:rPr lang="en-US" altLang="ko-KR" sz="2300" b="1" dirty="0">
+                <a:solidFill>
+                  <a:schemeClr val="bg1"/>
+                </a:solidFill>
+              </a:rPr>
+              <a:t>Client </a:t>
+            </a:r>
+            <a:r>
+              <a:rPr lang="ko-KR" altLang="en-US" sz="2300" b="1" dirty="0">
+                <a:solidFill>
+                  <a:schemeClr val="bg1"/>
+                </a:solidFill>
+              </a:rPr>
+              <a:t>파일에서는 다른 </a:t>
+            </a:r>
+            <a:r>
+              <a:rPr lang="en-US" altLang="ko-KR" sz="2300" b="1" dirty="0">
+                <a:solidFill>
+                  <a:schemeClr val="bg1"/>
+                </a:solidFill>
+              </a:rPr>
+              <a:t>PC , Laptop</a:t>
+            </a:r>
+            <a:r>
+              <a:rPr lang="ko-KR" altLang="en-US" sz="2300" b="1" dirty="0">
+                <a:solidFill>
+                  <a:schemeClr val="bg1"/>
+                </a:solidFill>
+              </a:rPr>
+              <a:t>과 같은 장비들을 배치하였습니다</a:t>
+            </a:r>
+            <a:r>
+              <a:rPr lang="en-US" altLang="ko-KR" sz="2300" b="1" dirty="0">
+                <a:solidFill>
+                  <a:schemeClr val="bg1"/>
+                </a:solidFill>
+              </a:rPr>
+              <a:t>. </a:t>
+            </a:r>
+          </a:p>
+          <a:p>
+            <a:pPr marL="0" indent="0" algn="ctr">
+              <a:buNone/>
+            </a:pPr>
+            <a:r>
+              <a:rPr lang="ko-KR" altLang="en-US" sz="2300" b="1" dirty="0">
+                <a:solidFill>
+                  <a:schemeClr val="bg1"/>
+                </a:solidFill>
+              </a:rPr>
+              <a:t>배치 규모가 커지다 보니 </a:t>
+            </a:r>
+            <a:r>
+              <a:rPr lang="en-US" altLang="ko-KR" sz="2300" b="1" dirty="0">
+                <a:solidFill>
+                  <a:schemeClr val="bg1"/>
+                </a:solidFill>
+              </a:rPr>
+              <a:t>Cluster </a:t>
+            </a:r>
+            <a:r>
+              <a:rPr lang="ko-KR" altLang="en-US" sz="2300" b="1" dirty="0">
+                <a:solidFill>
+                  <a:schemeClr val="bg1"/>
+                </a:solidFill>
+              </a:rPr>
+              <a:t>기능을 이용하여 그룹화를 시켰습니다</a:t>
+            </a:r>
+            <a:r>
+              <a:rPr lang="en-US" altLang="ko-KR" sz="2300" b="1" dirty="0">
+                <a:solidFill>
+                  <a:schemeClr val="bg1"/>
+                </a:solidFill>
+              </a:rPr>
+              <a:t>.</a:t>
+            </a:r>
+          </a:p>
+        </p:txBody>
+      </p:sp>
+      <p:pic>
+        <p:nvPicPr>
+          <p:cNvPr id="7" name="그림 6">
+            <a:extLst>
+              <a:ext uri="{FF2B5EF4-FFF2-40B4-BE49-F238E27FC236}">
+                <a16:creationId xmlns:a16="http://schemas.microsoft.com/office/drawing/2014/main" id="{6076DD5E-ABE7-5588-055E-CC5B2AFDF7A8}"/>
+              </a:ext>
+            </a:extLst>
+          </p:cNvPr>
+          <p:cNvPicPr>
+            <a:picLocks noChangeAspect="1"/>
+          </p:cNvPicPr>
+          <p:nvPr/>
+        </p:nvPicPr>
+        <p:blipFill>
+          <a:blip r:embed="rId2"/>
+          <a:stretch>
+            <a:fillRect/>
+          </a:stretch>
+        </p:blipFill>
+        <p:spPr>
+          <a:xfrm>
+            <a:off x="3398148" y="2746513"/>
+            <a:ext cx="5395704" cy="3877494"/>
+          </a:xfrm>
+          <a:prstGeom prst="rect">
+            <a:avLst/>
+          </a:prstGeom>
+        </p:spPr>
+      </p:pic>
+      <p:pic>
+        <p:nvPicPr>
+          <p:cNvPr id="9" name="그래픽 8" descr="사용자 윤곽선">
+            <a:extLst>
+              <a:ext uri="{FF2B5EF4-FFF2-40B4-BE49-F238E27FC236}">
+                <a16:creationId xmlns:a16="http://schemas.microsoft.com/office/drawing/2014/main" id="{0315A68E-AD7F-4CAE-8A03-AF3184D488D4}"/>
+              </a:ext>
+            </a:extLst>
+          </p:cNvPr>
+          <p:cNvPicPr>
+            <a:picLocks noChangeAspect="1"/>
+          </p:cNvPicPr>
+          <p:nvPr/>
+        </p:nvPicPr>
+        <p:blipFill>
+          <a:blip r:embed="rId3">
+            <a:extLst>
+              <a:ext uri="{28A0092B-C50C-407E-A947-70E740481C1C}">
+                <a14:useLocalDpi xmlns:a14="http://schemas.microsoft.com/office/drawing/2010/main" val="0"/>
+              </a:ext>
+              <a:ext uri="{96DAC541-7B7A-43D3-8B79-37D633B846F1}">
+                <asvg:svgBlip xmlns:asvg="http://schemas.microsoft.com/office/drawing/2016/SVG/main" r:embed="rId4"/>
+              </a:ext>
+            </a:extLst>
+          </a:blip>
+          <a:stretch>
+            <a:fillRect/>
+          </a:stretch>
+        </p:blipFill>
+        <p:spPr>
+          <a:xfrm>
+            <a:off x="3637721" y="570706"/>
+            <a:ext cx="914400" cy="914400"/>
+          </a:xfrm>
+          <a:prstGeom prst="rect">
+            <a:avLst/>
+          </a:prstGeom>
+        </p:spPr>
+      </p:pic>
+    </p:spTree>
+    <p:extLst>
+      <p:ext uri="{BB962C8B-B14F-4D97-AF65-F5344CB8AC3E}">
+        <p14:creationId xmlns:p14="http://schemas.microsoft.com/office/powerpoint/2010/main" val="3038199349"/>
+      </p:ext>
+    </p:extLst>
+  </p:cSld>
+  <p:clrMapOvr>
+    <a:masterClrMapping/>
+  </p:clrMapOvr>
+</p:sld>
+</file>
+
+<file path=ppt/slides/slide8.xml><?xml version="1.0" encoding="utf-8"?>
+<p:sld xmlns:a="http://schemas.openxmlformats.org/drawingml/2006/main" xmlns:r="http://schemas.openxmlformats.org/officeDocument/2006/relationships" xmlns:p="http://schemas.openxmlformats.org/presentationml/2006/main">
+  <p:cSld>
+    <p:bg>
+      <p:bgPr>
+        <a:solidFill>
+          <a:schemeClr val="tx1"/>
+        </a:solidFill>
+        <a:effectLst/>
+      </p:bgPr>
+    </p:bg>
+    <p:spTree>
+      <p:nvGrpSpPr>
+        <p:cNvPr id="1" name=""/>
+        <p:cNvGrpSpPr/>
+        <p:nvPr/>
+      </p:nvGrpSpPr>
+      <p:grpSpPr>
+        <a:xfrm>
+          <a:off x="0" y="0"/>
+          <a:ext cx="0" cy="0"/>
+          <a:chOff x="0" y="0"/>
+          <a:chExt cx="0" cy="0"/>
+        </a:xfrm>
+      </p:grpSpPr>
+      <p:sp>
+        <p:nvSpPr>
+          <p:cNvPr id="2" name="제목 1">
+            <a:extLst>
+              <a:ext uri="{FF2B5EF4-FFF2-40B4-BE49-F238E27FC236}">
+                <a16:creationId xmlns:a16="http://schemas.microsoft.com/office/drawing/2014/main" id="{D743DEC8-DB4B-3911-98B9-1D0071F97151}"/>
+              </a:ext>
+            </a:extLst>
+          </p:cNvPr>
+          <p:cNvSpPr>
+            <a:spLocks noGrp="1"/>
+          </p:cNvSpPr>
+          <p:nvPr>
+            <p:ph type="title"/>
+          </p:nvPr>
+        </p:nvSpPr>
+        <p:spPr>
+          <a:solidFill>
+            <a:schemeClr val="tx1"/>
+          </a:solidFill>
+        </p:spPr>
+        <p:txBody>
+          <a:bodyPr>
+            <a:normAutofit/>
+          </a:bodyPr>
+          <a:lstStyle/>
+          <a:p>
+            <a:pPr algn="ctr"/>
+            <a:r>
+              <a:rPr lang="en-US" altLang="ko-KR" sz="3500" b="1" dirty="0">
+                <a:solidFill>
+                  <a:schemeClr val="bg1"/>
+                </a:solidFill>
+              </a:rPr>
+              <a:t>Client1 Zone</a:t>
+            </a:r>
+            <a:endParaRPr lang="ko-KR" altLang="en-US" sz="3500" b="1" dirty="0">
+              <a:solidFill>
+                <a:schemeClr val="bg1"/>
+              </a:solidFill>
+            </a:endParaRPr>
+          </a:p>
+        </p:txBody>
+      </p:sp>
+      <p:sp>
+        <p:nvSpPr>
+          <p:cNvPr id="3" name="내용 개체 틀 2">
+            <a:extLst>
+              <a:ext uri="{FF2B5EF4-FFF2-40B4-BE49-F238E27FC236}">
+                <a16:creationId xmlns:a16="http://schemas.microsoft.com/office/drawing/2014/main" id="{34C4EE67-9F49-23A0-BBC7-77ABA37EFF16}"/>
+              </a:ext>
+            </a:extLst>
+          </p:cNvPr>
+          <p:cNvSpPr>
+            <a:spLocks noGrp="1"/>
+          </p:cNvSpPr>
+          <p:nvPr>
+            <p:ph idx="1"/>
+          </p:nvPr>
+        </p:nvSpPr>
+        <p:spPr>
+          <a:xfrm>
+            <a:off x="838200" y="1825625"/>
+            <a:ext cx="10515600" cy="1325563"/>
+          </a:xfrm>
+        </p:spPr>
+        <p:txBody>
+          <a:bodyPr>
+            <a:normAutofit/>
+          </a:bodyPr>
+          <a:lstStyle/>
+          <a:p>
+            <a:pPr marL="0" indent="0" algn="ctr">
+              <a:buNone/>
+            </a:pPr>
+            <a:r>
+              <a:rPr lang="en-US" altLang="ko-KR" sz="2300" b="1" dirty="0">
+                <a:solidFill>
+                  <a:schemeClr val="bg1"/>
+                </a:solidFill>
+              </a:rPr>
+              <a:t>Client1 Cluster</a:t>
+            </a:r>
+            <a:r>
+              <a:rPr lang="ko-KR" altLang="en-US" sz="2300" b="1" dirty="0">
+                <a:solidFill>
+                  <a:schemeClr val="bg1"/>
+                </a:solidFill>
+              </a:rPr>
+              <a:t>에서는 </a:t>
+            </a:r>
+            <a:r>
+              <a:rPr lang="en-US" altLang="ko-KR" sz="2300" b="1" dirty="0">
+                <a:solidFill>
+                  <a:schemeClr val="bg1"/>
+                </a:solidFill>
+              </a:rPr>
+              <a:t>switch</a:t>
+            </a:r>
+            <a:r>
+              <a:rPr lang="ko-KR" altLang="en-US" sz="2300" b="1" dirty="0">
+                <a:solidFill>
+                  <a:schemeClr val="bg1"/>
+                </a:solidFill>
+              </a:rPr>
+              <a:t>를 이용하여 장비를 배치하고</a:t>
+            </a:r>
+            <a:endParaRPr lang="en-US" altLang="ko-KR" sz="2300" b="1" dirty="0">
+              <a:solidFill>
+                <a:schemeClr val="bg1"/>
+              </a:solidFill>
+            </a:endParaRPr>
+          </a:p>
+          <a:p>
+            <a:pPr marL="0" indent="0" algn="ctr">
+              <a:buNone/>
+            </a:pPr>
+            <a:r>
+              <a:rPr lang="en-US" altLang="ko-KR" sz="2300" b="1" dirty="0" err="1">
+                <a:solidFill>
+                  <a:schemeClr val="bg1"/>
+                </a:solidFill>
+              </a:rPr>
+              <a:t>Vlan</a:t>
+            </a:r>
+            <a:r>
+              <a:rPr lang="ko-KR" altLang="en-US" sz="2300" b="1" dirty="0">
+                <a:solidFill>
+                  <a:schemeClr val="bg1"/>
+                </a:solidFill>
+              </a:rPr>
+              <a:t>을 통해서 네트워크를 나누었습니다</a:t>
+            </a:r>
+            <a:r>
+              <a:rPr lang="en-US" altLang="ko-KR" sz="2300" b="1" dirty="0">
+                <a:solidFill>
+                  <a:schemeClr val="bg1"/>
+                </a:solidFill>
+              </a:rPr>
+              <a:t>.</a:t>
+            </a:r>
+          </a:p>
+        </p:txBody>
+      </p:sp>
+      <p:pic>
+        <p:nvPicPr>
+          <p:cNvPr id="7" name="그래픽 6" descr="사용자 윤곽선">
+            <a:extLst>
+              <a:ext uri="{FF2B5EF4-FFF2-40B4-BE49-F238E27FC236}">
+                <a16:creationId xmlns:a16="http://schemas.microsoft.com/office/drawing/2014/main" id="{D97069B6-DF50-21F9-A311-2E0F4D92C2D1}"/>
+              </a:ext>
+            </a:extLst>
+          </p:cNvPr>
+          <p:cNvPicPr>
+            <a:picLocks noChangeAspect="1"/>
+          </p:cNvPicPr>
+          <p:nvPr/>
+        </p:nvPicPr>
+        <p:blipFill>
+          <a:blip r:embed="rId2">
+            <a:extLst>
+              <a:ext uri="{28A0092B-C50C-407E-A947-70E740481C1C}">
+                <a14:useLocalDpi xmlns:a14="http://schemas.microsoft.com/office/drawing/2010/main" val="0"/>
+              </a:ext>
+              <a:ext uri="{96DAC541-7B7A-43D3-8B79-37D633B846F1}">
+                <asvg:svgBlip xmlns:asvg="http://schemas.microsoft.com/office/drawing/2016/SVG/main" r:embed="rId3"/>
+              </a:ext>
+            </a:extLst>
+          </a:blip>
+          <a:stretch>
+            <a:fillRect/>
+          </a:stretch>
+        </p:blipFill>
+        <p:spPr>
+          <a:xfrm>
+            <a:off x="3637721" y="570706"/>
+            <a:ext cx="914400" cy="914400"/>
+          </a:xfrm>
+          <a:prstGeom prst="rect">
+            <a:avLst/>
+          </a:prstGeom>
+        </p:spPr>
+      </p:pic>
+    </p:spTree>
+    <p:extLst>
+      <p:ext uri="{BB962C8B-B14F-4D97-AF65-F5344CB8AC3E}">
+        <p14:creationId xmlns:p14="http://schemas.microsoft.com/office/powerpoint/2010/main" val="1206790259"/>
+      </p:ext>
+    </p:extLst>
+  </p:cSld>
+  <p:clrMapOvr>
+    <a:masterClrMapping/>
+  </p:clrMapOvr>
+</p:sld>
+</file>
+
+<file path=ppt/slides/slide9.xml><?xml version="1.0" encoding="utf-8"?>
+<p:sld xmlns:a="http://schemas.openxmlformats.org/drawingml/2006/main" xmlns:r="http://schemas.openxmlformats.org/officeDocument/2006/relationships" xmlns:p="http://schemas.openxmlformats.org/presentationml/2006/main">
+  <p:cSld>
+    <p:bg>
+      <p:bgPr>
+        <a:solidFill>
+          <a:schemeClr val="tx1"/>
+        </a:solidFill>
+        <a:effectLst/>
+      </p:bgPr>
+    </p:bg>
+    <p:spTree>
+      <p:nvGrpSpPr>
+        <p:cNvPr id="1" name=""/>
+        <p:cNvGrpSpPr/>
+        <p:nvPr/>
+      </p:nvGrpSpPr>
+      <p:grpSpPr>
+        <a:xfrm>
+          <a:off x="0" y="0"/>
+          <a:ext cx="0" cy="0"/>
+          <a:chOff x="0" y="0"/>
+          <a:chExt cx="0" cy="0"/>
+        </a:xfrm>
+      </p:grpSpPr>
+      <p:pic>
+        <p:nvPicPr>
+          <p:cNvPr id="10" name="그림 9">
+            <a:extLst>
+              <a:ext uri="{FF2B5EF4-FFF2-40B4-BE49-F238E27FC236}">
+                <a16:creationId xmlns:a16="http://schemas.microsoft.com/office/drawing/2014/main" id="{7398A479-33B9-FF7C-50A3-24792F52BC4C}"/>
+              </a:ext>
+            </a:extLst>
+          </p:cNvPr>
+          <p:cNvPicPr>
+            <a:picLocks noChangeAspect="1"/>
+          </p:cNvPicPr>
+          <p:nvPr/>
+        </p:nvPicPr>
+        <p:blipFill>
+          <a:blip r:embed="rId2"/>
+          <a:stretch>
+            <a:fillRect/>
+          </a:stretch>
+        </p:blipFill>
+        <p:spPr>
+          <a:xfrm>
+            <a:off x="1044523" y="1"/>
+            <a:ext cx="10107181" cy="6860868"/>
+          </a:xfrm>
+          <a:prstGeom prst="rect">
+            <a:avLst/>
+          </a:prstGeom>
+        </p:spPr>
+      </p:pic>
+    </p:spTree>
+    <p:extLst>
+      <p:ext uri="{BB962C8B-B14F-4D97-AF65-F5344CB8AC3E}">
+        <p14:creationId xmlns:p14="http://schemas.microsoft.com/office/powerpoint/2010/main" val="106552285"/>
       </p:ext>
     </p:extLst>
   </p:cSld>

</xml_diff>